<commit_message>
update class 10 slides and readme
</commit_message>
<xml_diff>
--- a/slides/10_model_evaluation_metrics.pptx
+++ b/slides/10_model_evaluation_metrics.pptx
@@ -6,7 +6,7 @@
     <p:sldMasterId id="2147483649" r:id="rId2"/>
   </p:sldMasterIdLst>
   <p:notesMasterIdLst>
-    <p:notesMasterId r:id="rId13"/>
+    <p:notesMasterId r:id="rId16"/>
   </p:notesMasterIdLst>
   <p:sldIdLst>
     <p:sldId id="473" r:id="rId3"/>
@@ -18,7 +18,10 @@
     <p:sldId id="506" r:id="rId9"/>
     <p:sldId id="483" r:id="rId10"/>
     <p:sldId id="498" r:id="rId11"/>
-    <p:sldId id="339" r:id="rId12"/>
+    <p:sldId id="508" r:id="rId12"/>
+    <p:sldId id="509" r:id="rId13"/>
+    <p:sldId id="510" r:id="rId14"/>
+    <p:sldId id="339" r:id="rId15"/>
   </p:sldIdLst>
   <p:sldSz cx="9363075" cy="5257800"/>
   <p:notesSz cx="6858000" cy="9144000"/>
@@ -232,11 +235,11 @@
           <c:showPercent val="0"/>
           <c:showBubbleSize val="0"/>
         </c:dLbls>
-        <c:axId val="35938688"/>
-        <c:axId val="35940224"/>
+        <c:axId val="34437376"/>
+        <c:axId val="34844672"/>
       </c:scatterChart>
       <c:valAx>
-        <c:axId val="35938688"/>
+        <c:axId val="34437376"/>
         <c:scaling>
           <c:orientation val="minMax"/>
         </c:scaling>
@@ -246,13 +249,13 @@
         <c:majorTickMark val="out"/>
         <c:minorTickMark val="none"/>
         <c:tickLblPos val="nextTo"/>
-        <c:crossAx val="35940224"/>
+        <c:crossAx val="34844672"/>
         <c:crosses val="autoZero"/>
         <c:crossBetween val="midCat"/>
         <c:majorUnit val="0.25"/>
       </c:valAx>
       <c:valAx>
-        <c:axId val="35940224"/>
+        <c:axId val="34844672"/>
         <c:scaling>
           <c:orientation val="minMax"/>
         </c:scaling>
@@ -262,7 +265,7 @@
         <c:majorTickMark val="out"/>
         <c:minorTickMark val="none"/>
         <c:tickLblPos val="nextTo"/>
-        <c:crossAx val="35938688"/>
+        <c:crossAx val="34437376"/>
         <c:crosses val="autoZero"/>
         <c:crossBetween val="midCat"/>
         <c:majorUnit val="0.25"/>
@@ -370,7 +373,7 @@
           <a:p>
             <a:fld id="{DB92F479-4B50-F243-9713-1B12EC2B4BDB}" type="datetimeFigureOut">
               <a:rPr lang="en-US" smtClean="0"/>
-              <a:t>1/25/2015</a:t>
+              <a:t>1/26/2015</a:t>
             </a:fld>
             <a:endParaRPr lang="en-US"/>
           </a:p>
@@ -766,7 +769,30 @@
           <a:bodyPr/>
           <a:lstStyle/>
           <a:p>
-            <a:endParaRPr lang="en-US" dirty="0"/>
+            <a:pPr marL="0" marR="0" indent="0" algn="l" defTabSz="457200" rtl="0" eaLnBrk="1" fontAlgn="auto" latinLnBrk="0" hangingPunct="1">
+              <a:lnSpc>
+                <a:spcPct val="100000"/>
+              </a:lnSpc>
+              <a:spcBef>
+                <a:spcPts val="0"/>
+              </a:spcBef>
+              <a:spcAft>
+                <a:spcPts val="0"/>
+              </a:spcAft>
+              <a:buClrTx/>
+              <a:buSzTx/>
+              <a:buFontTx/>
+              <a:buNone/>
+              <a:tabLst/>
+              <a:defRPr/>
+            </a:pPr>
+            <a:endParaRPr lang="en-US" sz="1200" baseline="0" dirty="0" smtClean="0">
+              <a:solidFill>
+                <a:prstClr val="black"/>
+              </a:solidFill>
+              <a:latin typeface="ArialMT"/>
+              <a:sym typeface="Wingdings"/>
+            </a:endParaRPr>
           </a:p>
         </p:txBody>
       </p:sp>
@@ -788,6 +814,304 @@
             <a:fld id="{ADD4B5B7-85EF-4E48-AC80-2380FACD9C23}" type="slidenum">
               <a:rPr lang="en-US" smtClean="0"/>
               <a:t>10</a:t>
+            </a:fld>
+            <a:endParaRPr lang="en-US"/>
+          </a:p>
+        </p:txBody>
+      </p:sp>
+    </p:spTree>
+    <p:extLst>
+      <p:ext uri="{BB962C8B-B14F-4D97-AF65-F5344CB8AC3E}">
+        <p14:creationId xmlns:p14="http://schemas.microsoft.com/office/powerpoint/2010/main" val="645762702"/>
+      </p:ext>
+    </p:extLst>
+  </p:cSld>
+  <p:clrMapOvr>
+    <a:masterClrMapping/>
+  </p:clrMapOvr>
+</p:notes>
+</file>
+
+<file path=ppt/notesSlides/notesSlide11.xml><?xml version="1.0" encoding="utf-8"?>
+<p:notes xmlns:a="http://schemas.openxmlformats.org/drawingml/2006/main" xmlns:r="http://schemas.openxmlformats.org/officeDocument/2006/relationships" xmlns:p="http://schemas.openxmlformats.org/presentationml/2006/main">
+  <p:cSld>
+    <p:spTree>
+      <p:nvGrpSpPr>
+        <p:cNvPr id="1" name=""/>
+        <p:cNvGrpSpPr/>
+        <p:nvPr/>
+      </p:nvGrpSpPr>
+      <p:grpSpPr>
+        <a:xfrm>
+          <a:off x="0" y="0"/>
+          <a:ext cx="0" cy="0"/>
+          <a:chOff x="0" y="0"/>
+          <a:chExt cx="0" cy="0"/>
+        </a:xfrm>
+      </p:grpSpPr>
+      <p:sp>
+        <p:nvSpPr>
+          <p:cNvPr id="2" name="Slide Image Placeholder 1"/>
+          <p:cNvSpPr>
+            <a:spLocks noGrp="1" noRot="1" noChangeAspect="1"/>
+          </p:cNvSpPr>
+          <p:nvPr>
+            <p:ph type="sldImg"/>
+          </p:nvPr>
+        </p:nvSpPr>
+        <p:spPr/>
+      </p:sp>
+      <p:sp>
+        <p:nvSpPr>
+          <p:cNvPr id="3" name="Notes Placeholder 2"/>
+          <p:cNvSpPr>
+            <a:spLocks noGrp="1"/>
+          </p:cNvSpPr>
+          <p:nvPr>
+            <p:ph type="body" idx="1"/>
+          </p:nvPr>
+        </p:nvSpPr>
+        <p:spPr/>
+        <p:txBody>
+          <a:bodyPr/>
+          <a:lstStyle/>
+          <a:p>
+            <a:pPr marL="0" marR="0" indent="0" algn="l" defTabSz="457200" rtl="0" eaLnBrk="1" fontAlgn="auto" latinLnBrk="0" hangingPunct="1">
+              <a:lnSpc>
+                <a:spcPct val="100000"/>
+              </a:lnSpc>
+              <a:spcBef>
+                <a:spcPts val="0"/>
+              </a:spcBef>
+              <a:spcAft>
+                <a:spcPts val="0"/>
+              </a:spcAft>
+              <a:buClrTx/>
+              <a:buSzTx/>
+              <a:buFontTx/>
+              <a:buNone/>
+              <a:tabLst/>
+              <a:defRPr/>
+            </a:pPr>
+            <a:endParaRPr lang="en-US" sz="1200" baseline="0" dirty="0" smtClean="0">
+              <a:solidFill>
+                <a:prstClr val="black"/>
+              </a:solidFill>
+              <a:latin typeface="ArialMT"/>
+              <a:sym typeface="Wingdings"/>
+            </a:endParaRPr>
+          </a:p>
+        </p:txBody>
+      </p:sp>
+      <p:sp>
+        <p:nvSpPr>
+          <p:cNvPr id="4" name="Slide Number Placeholder 3"/>
+          <p:cNvSpPr>
+            <a:spLocks noGrp="1"/>
+          </p:cNvSpPr>
+          <p:nvPr>
+            <p:ph type="sldNum" sz="quarter" idx="10"/>
+          </p:nvPr>
+        </p:nvSpPr>
+        <p:spPr/>
+        <p:txBody>
+          <a:bodyPr/>
+          <a:lstStyle/>
+          <a:p>
+            <a:fld id="{ADD4B5B7-85EF-4E48-AC80-2380FACD9C23}" type="slidenum">
+              <a:rPr lang="en-US" smtClean="0"/>
+              <a:t>11</a:t>
+            </a:fld>
+            <a:endParaRPr lang="en-US"/>
+          </a:p>
+        </p:txBody>
+      </p:sp>
+    </p:spTree>
+    <p:extLst>
+      <p:ext uri="{BB962C8B-B14F-4D97-AF65-F5344CB8AC3E}">
+        <p14:creationId xmlns:p14="http://schemas.microsoft.com/office/powerpoint/2010/main" val="645762702"/>
+      </p:ext>
+    </p:extLst>
+  </p:cSld>
+  <p:clrMapOvr>
+    <a:masterClrMapping/>
+  </p:clrMapOvr>
+</p:notes>
+</file>
+
+<file path=ppt/notesSlides/notesSlide12.xml><?xml version="1.0" encoding="utf-8"?>
+<p:notes xmlns:a="http://schemas.openxmlformats.org/drawingml/2006/main" xmlns:r="http://schemas.openxmlformats.org/officeDocument/2006/relationships" xmlns:p="http://schemas.openxmlformats.org/presentationml/2006/main">
+  <p:cSld>
+    <p:spTree>
+      <p:nvGrpSpPr>
+        <p:cNvPr id="1" name=""/>
+        <p:cNvGrpSpPr/>
+        <p:nvPr/>
+      </p:nvGrpSpPr>
+      <p:grpSpPr>
+        <a:xfrm>
+          <a:off x="0" y="0"/>
+          <a:ext cx="0" cy="0"/>
+          <a:chOff x="0" y="0"/>
+          <a:chExt cx="0" cy="0"/>
+        </a:xfrm>
+      </p:grpSpPr>
+      <p:sp>
+        <p:nvSpPr>
+          <p:cNvPr id="2" name="Slide Image Placeholder 1"/>
+          <p:cNvSpPr>
+            <a:spLocks noGrp="1" noRot="1" noChangeAspect="1"/>
+          </p:cNvSpPr>
+          <p:nvPr>
+            <p:ph type="sldImg"/>
+          </p:nvPr>
+        </p:nvSpPr>
+        <p:spPr/>
+      </p:sp>
+      <p:sp>
+        <p:nvSpPr>
+          <p:cNvPr id="3" name="Notes Placeholder 2"/>
+          <p:cNvSpPr>
+            <a:spLocks noGrp="1"/>
+          </p:cNvSpPr>
+          <p:nvPr>
+            <p:ph type="body" idx="1"/>
+          </p:nvPr>
+        </p:nvSpPr>
+        <p:spPr/>
+        <p:txBody>
+          <a:bodyPr/>
+          <a:lstStyle/>
+          <a:p>
+            <a:pPr marL="0" marR="0" indent="0" algn="l" defTabSz="457200" rtl="0" eaLnBrk="1" fontAlgn="auto" latinLnBrk="0" hangingPunct="1">
+              <a:lnSpc>
+                <a:spcPct val="100000"/>
+              </a:lnSpc>
+              <a:spcBef>
+                <a:spcPts val="0"/>
+              </a:spcBef>
+              <a:spcAft>
+                <a:spcPts val="0"/>
+              </a:spcAft>
+              <a:buClrTx/>
+              <a:buSzTx/>
+              <a:buFontTx/>
+              <a:buNone/>
+              <a:tabLst/>
+              <a:defRPr/>
+            </a:pPr>
+            <a:endParaRPr lang="en-US" sz="1200" baseline="0" dirty="0" smtClean="0">
+              <a:solidFill>
+                <a:prstClr val="black"/>
+              </a:solidFill>
+              <a:latin typeface="ArialMT"/>
+              <a:sym typeface="Wingdings"/>
+            </a:endParaRPr>
+          </a:p>
+        </p:txBody>
+      </p:sp>
+      <p:sp>
+        <p:nvSpPr>
+          <p:cNvPr id="4" name="Slide Number Placeholder 3"/>
+          <p:cNvSpPr>
+            <a:spLocks noGrp="1"/>
+          </p:cNvSpPr>
+          <p:nvPr>
+            <p:ph type="sldNum" sz="quarter" idx="10"/>
+          </p:nvPr>
+        </p:nvSpPr>
+        <p:spPr/>
+        <p:txBody>
+          <a:bodyPr/>
+          <a:lstStyle/>
+          <a:p>
+            <a:fld id="{ADD4B5B7-85EF-4E48-AC80-2380FACD9C23}" type="slidenum">
+              <a:rPr lang="en-US" smtClean="0"/>
+              <a:t>12</a:t>
+            </a:fld>
+            <a:endParaRPr lang="en-US"/>
+          </a:p>
+        </p:txBody>
+      </p:sp>
+    </p:spTree>
+    <p:extLst>
+      <p:ext uri="{BB962C8B-B14F-4D97-AF65-F5344CB8AC3E}">
+        <p14:creationId xmlns:p14="http://schemas.microsoft.com/office/powerpoint/2010/main" val="645762702"/>
+      </p:ext>
+    </p:extLst>
+  </p:cSld>
+  <p:clrMapOvr>
+    <a:masterClrMapping/>
+  </p:clrMapOvr>
+</p:notes>
+</file>
+
+<file path=ppt/notesSlides/notesSlide13.xml><?xml version="1.0" encoding="utf-8"?>
+<p:notes xmlns:a="http://schemas.openxmlformats.org/drawingml/2006/main" xmlns:r="http://schemas.openxmlformats.org/officeDocument/2006/relationships" xmlns:p="http://schemas.openxmlformats.org/presentationml/2006/main">
+  <p:cSld>
+    <p:spTree>
+      <p:nvGrpSpPr>
+        <p:cNvPr id="1" name=""/>
+        <p:cNvGrpSpPr/>
+        <p:nvPr/>
+      </p:nvGrpSpPr>
+      <p:grpSpPr>
+        <a:xfrm>
+          <a:off x="0" y="0"/>
+          <a:ext cx="0" cy="0"/>
+          <a:chOff x="0" y="0"/>
+          <a:chExt cx="0" cy="0"/>
+        </a:xfrm>
+      </p:grpSpPr>
+      <p:sp>
+        <p:nvSpPr>
+          <p:cNvPr id="2" name="Slide Image Placeholder 1"/>
+          <p:cNvSpPr>
+            <a:spLocks noGrp="1" noRot="1" noChangeAspect="1"/>
+          </p:cNvSpPr>
+          <p:nvPr>
+            <p:ph type="sldImg"/>
+          </p:nvPr>
+        </p:nvSpPr>
+        <p:spPr/>
+      </p:sp>
+      <p:sp>
+        <p:nvSpPr>
+          <p:cNvPr id="3" name="Notes Placeholder 2"/>
+          <p:cNvSpPr>
+            <a:spLocks noGrp="1"/>
+          </p:cNvSpPr>
+          <p:nvPr>
+            <p:ph type="body" idx="1"/>
+          </p:nvPr>
+        </p:nvSpPr>
+        <p:spPr/>
+        <p:txBody>
+          <a:bodyPr/>
+          <a:lstStyle/>
+          <a:p>
+            <a:endParaRPr lang="en-US" dirty="0"/>
+          </a:p>
+        </p:txBody>
+      </p:sp>
+      <p:sp>
+        <p:nvSpPr>
+          <p:cNvPr id="4" name="Slide Number Placeholder 3"/>
+          <p:cNvSpPr>
+            <a:spLocks noGrp="1"/>
+          </p:cNvSpPr>
+          <p:nvPr>
+            <p:ph type="sldNum" sz="quarter" idx="10"/>
+          </p:nvPr>
+        </p:nvSpPr>
+        <p:spPr/>
+        <p:txBody>
+          <a:bodyPr/>
+          <a:lstStyle/>
+          <a:p>
+            <a:fld id="{ADD4B5B7-85EF-4E48-AC80-2380FACD9C23}" type="slidenum">
+              <a:rPr lang="en-US" smtClean="0"/>
+              <a:t>13</a:t>
             </a:fld>
             <a:endParaRPr lang="en-US"/>
           </a:p>
@@ -8149,6 +8473,2959 @@
       </p:grpSpPr>
       <p:sp>
         <p:nvSpPr>
+          <p:cNvPr id="5" name="TextBox 4"/>
+          <p:cNvSpPr txBox="1"/>
+          <p:nvPr/>
+        </p:nvSpPr>
+        <p:spPr>
+          <a:xfrm>
+            <a:off x="3767137" y="1104900"/>
+            <a:ext cx="5029200" cy="1723549"/>
+          </a:xfrm>
+          <a:prstGeom prst="rect">
+            <a:avLst/>
+          </a:prstGeom>
+          <a:noFill/>
+        </p:spPr>
+        <p:txBody>
+          <a:bodyPr wrap="square" rtlCol="0">
+            <a:spAutoFit/>
+          </a:bodyPr>
+          <a:lstStyle/>
+          <a:p>
+            <a:pPr algn="l"/>
+            <a:r>
+              <a:rPr lang="en-US" sz="2400" u="sng" smtClean="0">
+                <a:latin typeface="PFDinTextCompPro-Italic"/>
+                <a:cs typeface="PFDinTextCompPro-Italic"/>
+              </a:rPr>
+              <a:t>TPR</a:t>
+            </a:r>
+            <a:r>
+              <a:rPr lang="en-US" sz="2400" smtClean="0">
+                <a:latin typeface="PFDinTextCompPro-Italic"/>
+                <a:cs typeface="PFDinTextCompPro-Italic"/>
+              </a:rPr>
+              <a:t>: When actual value is </a:t>
+            </a:r>
+            <a:r>
+              <a:rPr lang="en-US" sz="2400" b="1" smtClean="0">
+                <a:latin typeface="PFDinTextCompPro-Italic"/>
+                <a:cs typeface="PFDinTextCompPro-Italic"/>
+              </a:rPr>
+              <a:t>spam</a:t>
+            </a:r>
+            <a:r>
+              <a:rPr lang="en-US" sz="2400" smtClean="0">
+                <a:latin typeface="PFDinTextCompPro-Italic"/>
+                <a:cs typeface="PFDinTextCompPro-Italic"/>
+              </a:rPr>
+              <a:t>, how often is prediction </a:t>
+            </a:r>
+            <a:r>
+              <a:rPr lang="en-US" sz="2400" b="1" smtClean="0">
+                <a:latin typeface="PFDinTextCompPro-Italic"/>
+                <a:cs typeface="PFDinTextCompPro-Italic"/>
+              </a:rPr>
+              <a:t>correct</a:t>
+            </a:r>
+            <a:r>
+              <a:rPr lang="en-US" sz="2400" smtClean="0">
+                <a:latin typeface="PFDinTextCompPro-Italic"/>
+                <a:cs typeface="PFDinTextCompPro-Italic"/>
+              </a:rPr>
+              <a:t>?</a:t>
+            </a:r>
+          </a:p>
+          <a:p>
+            <a:pPr algn="l"/>
+            <a:endParaRPr lang="en-US" sz="1000" smtClean="0">
+              <a:latin typeface="PFDinTextCompPro-Italic"/>
+              <a:cs typeface="PFDinTextCompPro-Italic"/>
+            </a:endParaRPr>
+          </a:p>
+          <a:p>
+            <a:pPr algn="l"/>
+            <a:r>
+              <a:rPr lang="en-US" sz="2400" u="sng" smtClean="0">
+                <a:latin typeface="PFDinTextCompPro-Italic"/>
+                <a:cs typeface="PFDinTextCompPro-Italic"/>
+              </a:rPr>
+              <a:t>FPR</a:t>
+            </a:r>
+            <a:r>
+              <a:rPr lang="en-US" sz="2400" smtClean="0">
+                <a:latin typeface="PFDinTextCompPro-Italic"/>
+                <a:cs typeface="PFDinTextCompPro-Italic"/>
+              </a:rPr>
+              <a:t>: When actual value is </a:t>
+            </a:r>
+            <a:r>
+              <a:rPr lang="en-US" sz="2400" b="1" smtClean="0">
+                <a:latin typeface="PFDinTextCompPro-Italic"/>
+                <a:cs typeface="PFDinTextCompPro-Italic"/>
+              </a:rPr>
+              <a:t>ham</a:t>
+            </a:r>
+            <a:r>
+              <a:rPr lang="en-US" sz="2400" smtClean="0">
+                <a:latin typeface="PFDinTextCompPro-Italic"/>
+                <a:cs typeface="PFDinTextCompPro-Italic"/>
+              </a:rPr>
+              <a:t>, how often is prediction </a:t>
+            </a:r>
+            <a:r>
+              <a:rPr lang="en-US" sz="2400" b="1" smtClean="0">
+                <a:latin typeface="PFDinTextCompPro-Italic"/>
+                <a:cs typeface="PFDinTextCompPro-Italic"/>
+              </a:rPr>
+              <a:t>wrong</a:t>
+            </a:r>
+            <a:r>
+              <a:rPr lang="en-US" sz="2400" smtClean="0">
+                <a:latin typeface="PFDinTextCompPro-Italic"/>
+                <a:cs typeface="PFDinTextCompPro-Italic"/>
+              </a:rPr>
+              <a:t>?</a:t>
+            </a:r>
+            <a:endParaRPr lang="en-US" sz="2400" dirty="0" smtClean="0">
+              <a:latin typeface="PFDinTextCompPro-Italic"/>
+              <a:cs typeface="PFDinTextCompPro-Italic"/>
+            </a:endParaRPr>
+          </a:p>
+        </p:txBody>
+      </p:sp>
+      <p:sp>
+        <p:nvSpPr>
+          <p:cNvPr id="4" name="Content Placeholder 3"/>
+          <p:cNvSpPr>
+            <a:spLocks noGrp="1"/>
+          </p:cNvSpPr>
+          <p:nvPr>
+            <p:ph sz="quarter" idx="11"/>
+          </p:nvPr>
+        </p:nvSpPr>
+        <p:spPr>
+          <a:xfrm>
+            <a:off x="414337" y="495300"/>
+            <a:ext cx="6400800" cy="304800"/>
+          </a:xfrm>
+        </p:spPr>
+        <p:txBody>
+          <a:bodyPr/>
+          <a:lstStyle/>
+          <a:p>
+            <a:pPr eaLnBrk="1" hangingPunct="1">
+              <a:lnSpc>
+                <a:spcPts val="2448"/>
+              </a:lnSpc>
+              <a:defRPr/>
+            </a:pPr>
+            <a:r>
+              <a:rPr lang="en-US" smtClean="0"/>
+              <a:t>ROC Curve / AUC</a:t>
+            </a:r>
+            <a:endParaRPr lang="en-US" dirty="0"/>
+          </a:p>
+        </p:txBody>
+      </p:sp>
+      <p:sp>
+        <p:nvSpPr>
+          <p:cNvPr id="8" name="Slide Number Placeholder 3"/>
+          <p:cNvSpPr>
+            <a:spLocks noGrp="1"/>
+          </p:cNvSpPr>
+          <p:nvPr>
+            <p:ph type="sldNum" sz="quarter" idx="13"/>
+          </p:nvPr>
+        </p:nvSpPr>
+        <p:spPr/>
+        <p:txBody>
+          <a:bodyPr/>
+          <a:lstStyle/>
+          <a:p>
+            <a:pPr>
+              <a:defRPr/>
+            </a:pPr>
+            <a:fld id="{BD5AD749-DAD1-6A4A-A2AA-CB20EAD0AEB7}" type="slidenum">
+              <a:rPr lang="en-US"/>
+              <a:pPr>
+                <a:defRPr/>
+              </a:pPr>
+              <a:t>10</a:t>
+            </a:fld>
+            <a:endParaRPr lang="en-US"/>
+          </a:p>
+        </p:txBody>
+      </p:sp>
+      <p:graphicFrame>
+        <p:nvGraphicFramePr>
+          <p:cNvPr id="2" name="Table 1"/>
+          <p:cNvGraphicFramePr>
+            <a:graphicFrameLocks noGrp="1"/>
+          </p:cNvGraphicFramePr>
+          <p:nvPr>
+            <p:extLst>
+              <p:ext uri="{D42A27DB-BD31-4B8C-83A1-F6EECF244321}">
+                <p14:modId xmlns:p14="http://schemas.microsoft.com/office/powerpoint/2010/main" val="66571618"/>
+              </p:ext>
+            </p:extLst>
+          </p:nvPr>
+        </p:nvGraphicFramePr>
+        <p:xfrm>
+          <a:off x="719137" y="1257300"/>
+          <a:ext cx="2663826" cy="3454400"/>
+        </p:xfrm>
+        <a:graphic>
+          <a:graphicData uri="http://schemas.openxmlformats.org/drawingml/2006/table">
+            <a:tbl>
+              <a:tblPr firstRow="1" bandRow="1">
+                <a:tableStyleId>{5C22544A-7EE6-4342-B048-85BDC9FD1C3A}</a:tableStyleId>
+              </a:tblPr>
+              <a:tblGrid>
+                <a:gridCol w="887942"/>
+                <a:gridCol w="887942"/>
+                <a:gridCol w="887942"/>
+              </a:tblGrid>
+              <a:tr h="370840">
+                <a:tc>
+                  <a:txBody>
+                    <a:bodyPr/>
+                    <a:lstStyle/>
+                    <a:p>
+                      <a:r>
+                        <a:rPr lang="en-US" dirty="0" smtClean="0"/>
+                        <a:t>Email Number</a:t>
+                      </a:r>
+                      <a:endParaRPr lang="en-US" dirty="0"/>
+                    </a:p>
+                  </a:txBody>
+                  <a:tcPr/>
+                </a:tc>
+                <a:tc>
+                  <a:txBody>
+                    <a:bodyPr/>
+                    <a:lstStyle/>
+                    <a:p>
+                      <a:r>
+                        <a:rPr lang="en-US" dirty="0" smtClean="0"/>
+                        <a:t>Score</a:t>
+                      </a:r>
+                      <a:endParaRPr lang="en-US" dirty="0"/>
+                    </a:p>
+                  </a:txBody>
+                  <a:tcPr/>
+                </a:tc>
+                <a:tc>
+                  <a:txBody>
+                    <a:bodyPr/>
+                    <a:lstStyle/>
+                    <a:p>
+                      <a:r>
+                        <a:rPr lang="en-US" dirty="0" smtClean="0"/>
+                        <a:t>True Label</a:t>
+                      </a:r>
+                      <a:endParaRPr lang="en-US" dirty="0"/>
+                    </a:p>
+                  </a:txBody>
+                  <a:tcPr/>
+                </a:tc>
+              </a:tr>
+              <a:tr h="370840">
+                <a:tc>
+                  <a:txBody>
+                    <a:bodyPr/>
+                    <a:lstStyle/>
+                    <a:p>
+                      <a:r>
+                        <a:rPr lang="en-US" dirty="0" smtClean="0"/>
+                        <a:t>5</a:t>
+                      </a:r>
+                    </a:p>
+                  </a:txBody>
+                  <a:tcPr/>
+                </a:tc>
+                <a:tc>
+                  <a:txBody>
+                    <a:bodyPr/>
+                    <a:lstStyle/>
+                    <a:p>
+                      <a:r>
+                        <a:rPr lang="en-US" smtClean="0"/>
+                        <a:t>0.99</a:t>
+                      </a:r>
+                      <a:endParaRPr lang="en-US" dirty="0"/>
+                    </a:p>
+                  </a:txBody>
+                  <a:tcPr/>
+                </a:tc>
+                <a:tc>
+                  <a:txBody>
+                    <a:bodyPr/>
+                    <a:lstStyle/>
+                    <a:p>
+                      <a:r>
+                        <a:rPr lang="en-US" dirty="0" smtClean="0"/>
+                        <a:t>Spam</a:t>
+                      </a:r>
+                      <a:endParaRPr lang="en-US" dirty="0"/>
+                    </a:p>
+                  </a:txBody>
+                  <a:tcPr/>
+                </a:tc>
+              </a:tr>
+              <a:tr h="370840">
+                <a:tc>
+                  <a:txBody>
+                    <a:bodyPr/>
+                    <a:lstStyle/>
+                    <a:p>
+                      <a:r>
+                        <a:rPr lang="en-US" dirty="0" smtClean="0"/>
+                        <a:t>8</a:t>
+                      </a:r>
+                      <a:endParaRPr lang="en-US" dirty="0"/>
+                    </a:p>
+                  </a:txBody>
+                  <a:tcPr/>
+                </a:tc>
+                <a:tc>
+                  <a:txBody>
+                    <a:bodyPr/>
+                    <a:lstStyle/>
+                    <a:p>
+                      <a:r>
+                        <a:rPr lang="en-US" smtClean="0"/>
+                        <a:t>0.82</a:t>
+                      </a:r>
+                      <a:endParaRPr lang="en-US" dirty="0"/>
+                    </a:p>
+                  </a:txBody>
+                  <a:tcPr/>
+                </a:tc>
+                <a:tc>
+                  <a:txBody>
+                    <a:bodyPr/>
+                    <a:lstStyle/>
+                    <a:p>
+                      <a:r>
+                        <a:rPr lang="en-US" dirty="0" smtClean="0"/>
+                        <a:t>Spam</a:t>
+                      </a:r>
+                      <a:endParaRPr lang="en-US" dirty="0"/>
+                    </a:p>
+                  </a:txBody>
+                  <a:tcPr/>
+                </a:tc>
+              </a:tr>
+              <a:tr h="370840">
+                <a:tc>
+                  <a:txBody>
+                    <a:bodyPr/>
+                    <a:lstStyle/>
+                    <a:p>
+                      <a:r>
+                        <a:rPr lang="en-US" dirty="0" smtClean="0"/>
+                        <a:t>2</a:t>
+                      </a:r>
+                      <a:endParaRPr lang="en-US" dirty="0"/>
+                    </a:p>
+                  </a:txBody>
+                  <a:tcPr/>
+                </a:tc>
+                <a:tc>
+                  <a:txBody>
+                    <a:bodyPr/>
+                    <a:lstStyle/>
+                    <a:p>
+                      <a:r>
+                        <a:rPr lang="en-US" smtClean="0"/>
+                        <a:t>0.60</a:t>
+                      </a:r>
+                      <a:endParaRPr lang="en-US" dirty="0"/>
+                    </a:p>
+                  </a:txBody>
+                  <a:tcPr/>
+                </a:tc>
+                <a:tc>
+                  <a:txBody>
+                    <a:bodyPr/>
+                    <a:lstStyle/>
+                    <a:p>
+                      <a:r>
+                        <a:rPr lang="en-US" dirty="0" smtClean="0"/>
+                        <a:t>Spam</a:t>
+                      </a:r>
+                      <a:endParaRPr lang="en-US" dirty="0"/>
+                    </a:p>
+                  </a:txBody>
+                  <a:tcPr/>
+                </a:tc>
+              </a:tr>
+              <a:tr h="370840">
+                <a:tc>
+                  <a:txBody>
+                    <a:bodyPr/>
+                    <a:lstStyle/>
+                    <a:p>
+                      <a:r>
+                        <a:rPr lang="en-US" dirty="0" smtClean="0"/>
+                        <a:t>1</a:t>
+                      </a:r>
+                      <a:endParaRPr lang="en-US" dirty="0"/>
+                    </a:p>
+                  </a:txBody>
+                  <a:tcPr/>
+                </a:tc>
+                <a:tc>
+                  <a:txBody>
+                    <a:bodyPr/>
+                    <a:lstStyle/>
+                    <a:p>
+                      <a:r>
+                        <a:rPr lang="en-US" smtClean="0"/>
+                        <a:t>0.60</a:t>
+                      </a:r>
+                      <a:endParaRPr lang="en-US" dirty="0"/>
+                    </a:p>
+                  </a:txBody>
+                  <a:tcPr/>
+                </a:tc>
+                <a:tc>
+                  <a:txBody>
+                    <a:bodyPr/>
+                    <a:lstStyle/>
+                    <a:p>
+                      <a:r>
+                        <a:rPr lang="en-US" dirty="0" smtClean="0"/>
+                        <a:t>Ham</a:t>
+                      </a:r>
+                      <a:endParaRPr lang="en-US" dirty="0"/>
+                    </a:p>
+                  </a:txBody>
+                  <a:tcPr/>
+                </a:tc>
+              </a:tr>
+              <a:tr h="370840">
+                <a:tc>
+                  <a:txBody>
+                    <a:bodyPr/>
+                    <a:lstStyle/>
+                    <a:p>
+                      <a:r>
+                        <a:rPr lang="en-US" dirty="0" smtClean="0"/>
+                        <a:t>7</a:t>
+                      </a:r>
+                      <a:endParaRPr lang="en-US" dirty="0"/>
+                    </a:p>
+                  </a:txBody>
+                  <a:tcPr/>
+                </a:tc>
+                <a:tc>
+                  <a:txBody>
+                    <a:bodyPr/>
+                    <a:lstStyle/>
+                    <a:p>
+                      <a:r>
+                        <a:rPr lang="en-US" smtClean="0"/>
+                        <a:t>0.48</a:t>
+                      </a:r>
+                      <a:endParaRPr lang="en-US" dirty="0"/>
+                    </a:p>
+                  </a:txBody>
+                  <a:tcPr/>
+                </a:tc>
+                <a:tc>
+                  <a:txBody>
+                    <a:bodyPr/>
+                    <a:lstStyle/>
+                    <a:p>
+                      <a:r>
+                        <a:rPr lang="en-US" dirty="0" smtClean="0"/>
+                        <a:t>Spam</a:t>
+                      </a:r>
+                      <a:endParaRPr lang="en-US" dirty="0"/>
+                    </a:p>
+                  </a:txBody>
+                  <a:tcPr/>
+                </a:tc>
+              </a:tr>
+              <a:tr h="370840">
+                <a:tc>
+                  <a:txBody>
+                    <a:bodyPr/>
+                    <a:lstStyle/>
+                    <a:p>
+                      <a:r>
+                        <a:rPr lang="en-US" dirty="0" smtClean="0"/>
+                        <a:t>3</a:t>
+                      </a:r>
+                      <a:endParaRPr lang="en-US" dirty="0"/>
+                    </a:p>
+                  </a:txBody>
+                  <a:tcPr/>
+                </a:tc>
+                <a:tc>
+                  <a:txBody>
+                    <a:bodyPr/>
+                    <a:lstStyle/>
+                    <a:p>
+                      <a:r>
+                        <a:rPr lang="en-US" dirty="0" smtClean="0"/>
+                        <a:t>0.22</a:t>
+                      </a:r>
+                      <a:endParaRPr lang="en-US" dirty="0"/>
+                    </a:p>
+                  </a:txBody>
+                  <a:tcPr/>
+                </a:tc>
+                <a:tc>
+                  <a:txBody>
+                    <a:bodyPr/>
+                    <a:lstStyle/>
+                    <a:p>
+                      <a:r>
+                        <a:rPr lang="en-US" dirty="0" smtClean="0"/>
+                        <a:t>Ham</a:t>
+                      </a:r>
+                      <a:endParaRPr lang="en-US" dirty="0"/>
+                    </a:p>
+                  </a:txBody>
+                  <a:tcPr/>
+                </a:tc>
+              </a:tr>
+              <a:tr h="370840">
+                <a:tc>
+                  <a:txBody>
+                    <a:bodyPr/>
+                    <a:lstStyle/>
+                    <a:p>
+                      <a:r>
+                        <a:rPr lang="en-US" dirty="0" smtClean="0"/>
+                        <a:t>4</a:t>
+                      </a:r>
+                      <a:endParaRPr lang="en-US" dirty="0"/>
+                    </a:p>
+                  </a:txBody>
+                  <a:tcPr/>
+                </a:tc>
+                <a:tc>
+                  <a:txBody>
+                    <a:bodyPr/>
+                    <a:lstStyle/>
+                    <a:p>
+                      <a:r>
+                        <a:rPr lang="en-US" dirty="0" smtClean="0"/>
+                        <a:t>0.10</a:t>
+                      </a:r>
+                      <a:endParaRPr lang="en-US" dirty="0"/>
+                    </a:p>
+                  </a:txBody>
+                  <a:tcPr/>
+                </a:tc>
+                <a:tc>
+                  <a:txBody>
+                    <a:bodyPr/>
+                    <a:lstStyle/>
+                    <a:p>
+                      <a:r>
+                        <a:rPr lang="en-US" dirty="0" smtClean="0"/>
+                        <a:t>Ham</a:t>
+                      </a:r>
+                      <a:endParaRPr lang="en-US" dirty="0"/>
+                    </a:p>
+                  </a:txBody>
+                  <a:tcPr/>
+                </a:tc>
+              </a:tr>
+              <a:tr h="370840">
+                <a:tc>
+                  <a:txBody>
+                    <a:bodyPr/>
+                    <a:lstStyle/>
+                    <a:p>
+                      <a:r>
+                        <a:rPr lang="en-US" dirty="0" smtClean="0"/>
+                        <a:t>6</a:t>
+                      </a:r>
+                      <a:endParaRPr lang="en-US" dirty="0"/>
+                    </a:p>
+                  </a:txBody>
+                  <a:tcPr/>
+                </a:tc>
+                <a:tc>
+                  <a:txBody>
+                    <a:bodyPr/>
+                    <a:lstStyle/>
+                    <a:p>
+                      <a:r>
+                        <a:rPr lang="en-US" dirty="0" smtClean="0"/>
+                        <a:t>0.02</a:t>
+                      </a:r>
+                      <a:endParaRPr lang="en-US" dirty="0"/>
+                    </a:p>
+                  </a:txBody>
+                  <a:tcPr/>
+                </a:tc>
+                <a:tc>
+                  <a:txBody>
+                    <a:bodyPr/>
+                    <a:lstStyle/>
+                    <a:p>
+                      <a:r>
+                        <a:rPr lang="en-US" dirty="0" smtClean="0"/>
+                        <a:t>Ham</a:t>
+                      </a:r>
+                      <a:endParaRPr lang="en-US" dirty="0"/>
+                    </a:p>
+                  </a:txBody>
+                  <a:tcPr/>
+                </a:tc>
+              </a:tr>
+            </a:tbl>
+          </a:graphicData>
+        </a:graphic>
+      </p:graphicFrame>
+      <p:graphicFrame>
+        <p:nvGraphicFramePr>
+          <p:cNvPr id="6" name="Table 5"/>
+          <p:cNvGraphicFramePr>
+            <a:graphicFrameLocks noGrp="1"/>
+          </p:cNvGraphicFramePr>
+          <p:nvPr>
+            <p:extLst>
+              <p:ext uri="{D42A27DB-BD31-4B8C-83A1-F6EECF244321}">
+                <p14:modId xmlns:p14="http://schemas.microsoft.com/office/powerpoint/2010/main" val="2525169373"/>
+              </p:ext>
+            </p:extLst>
+          </p:nvPr>
+        </p:nvGraphicFramePr>
+        <p:xfrm>
+          <a:off x="3843337" y="3238500"/>
+          <a:ext cx="4648200" cy="1447800"/>
+        </p:xfrm>
+        <a:graphic>
+          <a:graphicData uri="http://schemas.openxmlformats.org/drawingml/2006/table">
+            <a:tbl>
+              <a:tblPr firstRow="1" bandRow="1">
+                <a:tableStyleId>{5C22544A-7EE6-4342-B048-85BDC9FD1C3A}</a:tableStyleId>
+              </a:tblPr>
+              <a:tblGrid>
+                <a:gridCol w="685800"/>
+                <a:gridCol w="773349"/>
+                <a:gridCol w="826851"/>
+                <a:gridCol w="685800"/>
+                <a:gridCol w="838200"/>
+                <a:gridCol w="838200"/>
+              </a:tblGrid>
+              <a:tr h="266492">
+                <a:tc>
+                  <a:txBody>
+                    <a:bodyPr/>
+                    <a:lstStyle/>
+                    <a:p>
+                      <a:r>
+                        <a:rPr lang="en-US" smtClean="0"/>
+                        <a:t>Cutoff</a:t>
+                      </a:r>
+                      <a:endParaRPr lang="en-US"/>
+                    </a:p>
+                  </a:txBody>
+                  <a:tcPr/>
+                </a:tc>
+                <a:tc>
+                  <a:txBody>
+                    <a:bodyPr/>
+                    <a:lstStyle/>
+                    <a:p>
+                      <a:r>
+                        <a:rPr lang="en-US" smtClean="0"/>
+                        <a:t>TPR (y)</a:t>
+                      </a:r>
+                      <a:endParaRPr lang="en-US"/>
+                    </a:p>
+                  </a:txBody>
+                  <a:tcPr/>
+                </a:tc>
+                <a:tc>
+                  <a:txBody>
+                    <a:bodyPr/>
+                    <a:lstStyle/>
+                    <a:p>
+                      <a:r>
+                        <a:rPr lang="en-US" smtClean="0"/>
+                        <a:t>FPR (x)</a:t>
+                      </a:r>
+                      <a:endParaRPr lang="en-US"/>
+                    </a:p>
+                  </a:txBody>
+                  <a:tcPr/>
+                </a:tc>
+                <a:tc>
+                  <a:txBody>
+                    <a:bodyPr/>
+                    <a:lstStyle/>
+                    <a:p>
+                      <a:r>
+                        <a:rPr lang="en-US" smtClean="0"/>
+                        <a:t>Cutoff</a:t>
+                      </a:r>
+                      <a:endParaRPr lang="en-US"/>
+                    </a:p>
+                  </a:txBody>
+                  <a:tcPr/>
+                </a:tc>
+                <a:tc>
+                  <a:txBody>
+                    <a:bodyPr/>
+                    <a:lstStyle/>
+                    <a:p>
+                      <a:r>
+                        <a:rPr lang="en-US" smtClean="0"/>
+                        <a:t>TPR (y)</a:t>
+                      </a:r>
+                      <a:endParaRPr lang="en-US"/>
+                    </a:p>
+                  </a:txBody>
+                  <a:tcPr/>
+                </a:tc>
+                <a:tc>
+                  <a:txBody>
+                    <a:bodyPr/>
+                    <a:lstStyle/>
+                    <a:p>
+                      <a:r>
+                        <a:rPr lang="en-US" smtClean="0"/>
+                        <a:t>FPR (x)</a:t>
+                      </a:r>
+                      <a:endParaRPr lang="en-US"/>
+                    </a:p>
+                  </a:txBody>
+                  <a:tcPr/>
+                </a:tc>
+              </a:tr>
+              <a:tr h="266492">
+                <a:tc>
+                  <a:txBody>
+                    <a:bodyPr/>
+                    <a:lstStyle/>
+                    <a:p>
+                      <a:r>
+                        <a:rPr lang="en-US" b="1" smtClean="0"/>
+                        <a:t>0</a:t>
+                      </a:r>
+                      <a:endParaRPr lang="en-US" b="1"/>
+                    </a:p>
+                  </a:txBody>
+                  <a:tcPr/>
+                </a:tc>
+                <a:tc>
+                  <a:txBody>
+                    <a:bodyPr/>
+                    <a:lstStyle/>
+                    <a:p>
+                      <a:endParaRPr lang="en-US"/>
+                    </a:p>
+                  </a:txBody>
+                  <a:tcPr/>
+                </a:tc>
+                <a:tc>
+                  <a:txBody>
+                    <a:bodyPr/>
+                    <a:lstStyle/>
+                    <a:p>
+                      <a:endParaRPr lang="en-US"/>
+                    </a:p>
+                  </a:txBody>
+                  <a:tcPr/>
+                </a:tc>
+                <a:tc>
+                  <a:txBody>
+                    <a:bodyPr/>
+                    <a:lstStyle/>
+                    <a:p>
+                      <a:r>
+                        <a:rPr lang="en-US" b="1" smtClean="0"/>
+                        <a:t>0.50</a:t>
+                      </a:r>
+                      <a:endParaRPr lang="en-US" b="1"/>
+                    </a:p>
+                  </a:txBody>
+                  <a:tcPr/>
+                </a:tc>
+                <a:tc>
+                  <a:txBody>
+                    <a:bodyPr/>
+                    <a:lstStyle/>
+                    <a:p>
+                      <a:endParaRPr lang="en-US"/>
+                    </a:p>
+                  </a:txBody>
+                  <a:tcPr/>
+                </a:tc>
+                <a:tc>
+                  <a:txBody>
+                    <a:bodyPr/>
+                    <a:lstStyle/>
+                    <a:p>
+                      <a:endParaRPr lang="en-US"/>
+                    </a:p>
+                  </a:txBody>
+                  <a:tcPr/>
+                </a:tc>
+              </a:tr>
+              <a:tr h="266492">
+                <a:tc>
+                  <a:txBody>
+                    <a:bodyPr/>
+                    <a:lstStyle/>
+                    <a:p>
+                      <a:r>
+                        <a:rPr lang="en-US" b="1" smtClean="0"/>
+                        <a:t>0.05</a:t>
+                      </a:r>
+                      <a:endParaRPr lang="en-US" b="1"/>
+                    </a:p>
+                  </a:txBody>
+                  <a:tcPr/>
+                </a:tc>
+                <a:tc>
+                  <a:txBody>
+                    <a:bodyPr/>
+                    <a:lstStyle/>
+                    <a:p>
+                      <a:endParaRPr lang="en-US"/>
+                    </a:p>
+                  </a:txBody>
+                  <a:tcPr/>
+                </a:tc>
+                <a:tc>
+                  <a:txBody>
+                    <a:bodyPr/>
+                    <a:lstStyle/>
+                    <a:p>
+                      <a:endParaRPr lang="en-US"/>
+                    </a:p>
+                  </a:txBody>
+                  <a:tcPr/>
+                </a:tc>
+                <a:tc>
+                  <a:txBody>
+                    <a:bodyPr/>
+                    <a:lstStyle/>
+                    <a:p>
+                      <a:r>
+                        <a:rPr lang="en-US" b="1" smtClean="0"/>
+                        <a:t>0.65</a:t>
+                      </a:r>
+                      <a:endParaRPr lang="en-US" b="1"/>
+                    </a:p>
+                  </a:txBody>
+                  <a:tcPr/>
+                </a:tc>
+                <a:tc>
+                  <a:txBody>
+                    <a:bodyPr/>
+                    <a:lstStyle/>
+                    <a:p>
+                      <a:endParaRPr lang="en-US"/>
+                    </a:p>
+                  </a:txBody>
+                  <a:tcPr/>
+                </a:tc>
+                <a:tc>
+                  <a:txBody>
+                    <a:bodyPr/>
+                    <a:lstStyle/>
+                    <a:p>
+                      <a:endParaRPr lang="en-US"/>
+                    </a:p>
+                  </a:txBody>
+                  <a:tcPr/>
+                </a:tc>
+              </a:tr>
+              <a:tr h="266492">
+                <a:tc>
+                  <a:txBody>
+                    <a:bodyPr/>
+                    <a:lstStyle/>
+                    <a:p>
+                      <a:r>
+                        <a:rPr lang="en-US" b="1" smtClean="0"/>
+                        <a:t>0.15</a:t>
+                      </a:r>
+                      <a:endParaRPr lang="en-US" b="1"/>
+                    </a:p>
+                  </a:txBody>
+                  <a:tcPr/>
+                </a:tc>
+                <a:tc>
+                  <a:txBody>
+                    <a:bodyPr/>
+                    <a:lstStyle/>
+                    <a:p>
+                      <a:endParaRPr lang="en-US"/>
+                    </a:p>
+                  </a:txBody>
+                  <a:tcPr/>
+                </a:tc>
+                <a:tc>
+                  <a:txBody>
+                    <a:bodyPr/>
+                    <a:lstStyle/>
+                    <a:p>
+                      <a:endParaRPr lang="en-US"/>
+                    </a:p>
+                  </a:txBody>
+                  <a:tcPr/>
+                </a:tc>
+                <a:tc>
+                  <a:txBody>
+                    <a:bodyPr/>
+                    <a:lstStyle/>
+                    <a:p>
+                      <a:r>
+                        <a:rPr lang="en-US" b="1" smtClean="0"/>
+                        <a:t>0.85</a:t>
+                      </a:r>
+                      <a:endParaRPr lang="en-US" b="1"/>
+                    </a:p>
+                  </a:txBody>
+                  <a:tcPr/>
+                </a:tc>
+                <a:tc>
+                  <a:txBody>
+                    <a:bodyPr/>
+                    <a:lstStyle/>
+                    <a:p>
+                      <a:endParaRPr lang="en-US"/>
+                    </a:p>
+                  </a:txBody>
+                  <a:tcPr/>
+                </a:tc>
+                <a:tc>
+                  <a:txBody>
+                    <a:bodyPr/>
+                    <a:lstStyle/>
+                    <a:p>
+                      <a:endParaRPr lang="en-US"/>
+                    </a:p>
+                  </a:txBody>
+                  <a:tcPr/>
+                </a:tc>
+              </a:tr>
+              <a:tr h="266492">
+                <a:tc>
+                  <a:txBody>
+                    <a:bodyPr/>
+                    <a:lstStyle/>
+                    <a:p>
+                      <a:r>
+                        <a:rPr lang="en-US" b="1" smtClean="0"/>
+                        <a:t>0.25</a:t>
+                      </a:r>
+                      <a:endParaRPr lang="en-US" b="1"/>
+                    </a:p>
+                  </a:txBody>
+                  <a:tcPr/>
+                </a:tc>
+                <a:tc>
+                  <a:txBody>
+                    <a:bodyPr/>
+                    <a:lstStyle/>
+                    <a:p>
+                      <a:endParaRPr lang="en-US"/>
+                    </a:p>
+                  </a:txBody>
+                  <a:tcPr/>
+                </a:tc>
+                <a:tc>
+                  <a:txBody>
+                    <a:bodyPr/>
+                    <a:lstStyle/>
+                    <a:p>
+                      <a:endParaRPr lang="en-US"/>
+                    </a:p>
+                  </a:txBody>
+                  <a:tcPr/>
+                </a:tc>
+                <a:tc>
+                  <a:txBody>
+                    <a:bodyPr/>
+                    <a:lstStyle/>
+                    <a:p>
+                      <a:r>
+                        <a:rPr lang="en-US" b="1" smtClean="0"/>
+                        <a:t>1</a:t>
+                      </a:r>
+                      <a:endParaRPr lang="en-US" b="1"/>
+                    </a:p>
+                  </a:txBody>
+                  <a:tcPr/>
+                </a:tc>
+                <a:tc>
+                  <a:txBody>
+                    <a:bodyPr/>
+                    <a:lstStyle/>
+                    <a:p>
+                      <a:endParaRPr lang="en-US"/>
+                    </a:p>
+                  </a:txBody>
+                  <a:tcPr/>
+                </a:tc>
+                <a:tc>
+                  <a:txBody>
+                    <a:bodyPr/>
+                    <a:lstStyle/>
+                    <a:p>
+                      <a:endParaRPr lang="en-US"/>
+                    </a:p>
+                  </a:txBody>
+                  <a:tcPr/>
+                </a:tc>
+              </a:tr>
+            </a:tbl>
+          </a:graphicData>
+        </a:graphic>
+      </p:graphicFrame>
+    </p:spTree>
+    <p:extLst>
+      <p:ext uri="{BB962C8B-B14F-4D97-AF65-F5344CB8AC3E}">
+        <p14:creationId xmlns:p14="http://schemas.microsoft.com/office/powerpoint/2010/main" val="4115606143"/>
+      </p:ext>
+    </p:extLst>
+  </p:cSld>
+  <p:clrMapOvr>
+    <a:masterClrMapping/>
+  </p:clrMapOvr>
+  <p:transition/>
+  <p:timing>
+    <p:tnLst>
+      <p:par>
+        <p:cTn id="1" dur="indefinite" restart="never" nodeType="tmRoot">
+          <p:childTnLst>
+            <p:seq concurrent="1" nextAc="seek">
+              <p:cTn id="2" dur="indefinite" nodeType="mainSeq">
+                <p:childTnLst>
+                  <p:par>
+                    <p:cTn id="3" fill="hold">
+                      <p:stCondLst>
+                        <p:cond delay="indefinite"/>
+                      </p:stCondLst>
+                      <p:childTnLst>
+                        <p:par>
+                          <p:cTn id="4" fill="hold">
+                            <p:stCondLst>
+                              <p:cond delay="0"/>
+                            </p:stCondLst>
+                            <p:childTnLst>
+                              <p:par>
+                                <p:cTn id="5" presetID="1" presetClass="entr" presetSubtype="0" fill="hold" nodeType="clickEffect">
+                                  <p:stCondLst>
+                                    <p:cond delay="0"/>
+                                  </p:stCondLst>
+                                  <p:childTnLst>
+                                    <p:set>
+                                      <p:cBhvr>
+                                        <p:cTn id="6" dur="1" fill="hold">
+                                          <p:stCondLst>
+                                            <p:cond delay="0"/>
+                                          </p:stCondLst>
+                                        </p:cTn>
+                                        <p:tgtEl>
+                                          <p:spTgt spid="6"/>
+                                        </p:tgtEl>
+                                        <p:attrNameLst>
+                                          <p:attrName>style.visibility</p:attrName>
+                                        </p:attrNameLst>
+                                      </p:cBhvr>
+                                      <p:to>
+                                        <p:strVal val="visible"/>
+                                      </p:to>
+                                    </p:set>
+                                  </p:childTnLst>
+                                </p:cTn>
+                              </p:par>
+                            </p:childTnLst>
+                          </p:cTn>
+                        </p:par>
+                      </p:childTnLst>
+                    </p:cTn>
+                  </p:par>
+                </p:childTnLst>
+              </p:cTn>
+              <p:prevCondLst>
+                <p:cond evt="onPrev" delay="0">
+                  <p:tgtEl>
+                    <p:sldTgt/>
+                  </p:tgtEl>
+                </p:cond>
+              </p:prevCondLst>
+              <p:nextCondLst>
+                <p:cond evt="onNext" delay="0">
+                  <p:tgtEl>
+                    <p:sldTgt/>
+                  </p:tgtEl>
+                </p:cond>
+              </p:nextCondLst>
+            </p:seq>
+          </p:childTnLst>
+        </p:cTn>
+      </p:par>
+    </p:tnLst>
+  </p:timing>
+</p:sld>
+</file>
+
+<file path=ppt/slides/slide11.xml><?xml version="1.0" encoding="utf-8"?>
+<p:sld xmlns:a="http://schemas.openxmlformats.org/drawingml/2006/main" xmlns:r="http://schemas.openxmlformats.org/officeDocument/2006/relationships" xmlns:p="http://schemas.openxmlformats.org/presentationml/2006/main">
+  <p:cSld>
+    <p:spTree>
+      <p:nvGrpSpPr>
+        <p:cNvPr id="1" name=""/>
+        <p:cNvGrpSpPr/>
+        <p:nvPr/>
+      </p:nvGrpSpPr>
+      <p:grpSpPr>
+        <a:xfrm>
+          <a:off x="0" y="0"/>
+          <a:ext cx="0" cy="0"/>
+          <a:chOff x="0" y="0"/>
+          <a:chExt cx="0" cy="0"/>
+        </a:xfrm>
+      </p:grpSpPr>
+      <p:sp>
+        <p:nvSpPr>
+          <p:cNvPr id="5" name="TextBox 4"/>
+          <p:cNvSpPr txBox="1"/>
+          <p:nvPr/>
+        </p:nvSpPr>
+        <p:spPr>
+          <a:xfrm>
+            <a:off x="3767137" y="1104900"/>
+            <a:ext cx="5029200" cy="1723549"/>
+          </a:xfrm>
+          <a:prstGeom prst="rect">
+            <a:avLst/>
+          </a:prstGeom>
+          <a:noFill/>
+        </p:spPr>
+        <p:txBody>
+          <a:bodyPr wrap="square" rtlCol="0">
+            <a:spAutoFit/>
+          </a:bodyPr>
+          <a:lstStyle/>
+          <a:p>
+            <a:pPr algn="l"/>
+            <a:r>
+              <a:rPr lang="en-US" sz="2400" u="sng" smtClean="0">
+                <a:latin typeface="PFDinTextCompPro-Italic"/>
+                <a:cs typeface="PFDinTextCompPro-Italic"/>
+              </a:rPr>
+              <a:t>TPR</a:t>
+            </a:r>
+            <a:r>
+              <a:rPr lang="en-US" sz="2400" smtClean="0">
+                <a:latin typeface="PFDinTextCompPro-Italic"/>
+                <a:cs typeface="PFDinTextCompPro-Italic"/>
+              </a:rPr>
+              <a:t>: When actual value is </a:t>
+            </a:r>
+            <a:r>
+              <a:rPr lang="en-US" sz="2400" b="1" smtClean="0">
+                <a:latin typeface="PFDinTextCompPro-Italic"/>
+                <a:cs typeface="PFDinTextCompPro-Italic"/>
+              </a:rPr>
+              <a:t>spam</a:t>
+            </a:r>
+            <a:r>
+              <a:rPr lang="en-US" sz="2400" smtClean="0">
+                <a:latin typeface="PFDinTextCompPro-Italic"/>
+                <a:cs typeface="PFDinTextCompPro-Italic"/>
+              </a:rPr>
+              <a:t>, how often is prediction </a:t>
+            </a:r>
+            <a:r>
+              <a:rPr lang="en-US" sz="2400" b="1" smtClean="0">
+                <a:latin typeface="PFDinTextCompPro-Italic"/>
+                <a:cs typeface="PFDinTextCompPro-Italic"/>
+              </a:rPr>
+              <a:t>correct</a:t>
+            </a:r>
+            <a:r>
+              <a:rPr lang="en-US" sz="2400" smtClean="0">
+                <a:latin typeface="PFDinTextCompPro-Italic"/>
+                <a:cs typeface="PFDinTextCompPro-Italic"/>
+              </a:rPr>
+              <a:t>?</a:t>
+            </a:r>
+          </a:p>
+          <a:p>
+            <a:pPr algn="l"/>
+            <a:endParaRPr lang="en-US" sz="1000" smtClean="0">
+              <a:latin typeface="PFDinTextCompPro-Italic"/>
+              <a:cs typeface="PFDinTextCompPro-Italic"/>
+            </a:endParaRPr>
+          </a:p>
+          <a:p>
+            <a:pPr algn="l"/>
+            <a:r>
+              <a:rPr lang="en-US" sz="2400" u="sng" smtClean="0">
+                <a:latin typeface="PFDinTextCompPro-Italic"/>
+                <a:cs typeface="PFDinTextCompPro-Italic"/>
+              </a:rPr>
+              <a:t>FPR</a:t>
+            </a:r>
+            <a:r>
+              <a:rPr lang="en-US" sz="2400" smtClean="0">
+                <a:latin typeface="PFDinTextCompPro-Italic"/>
+                <a:cs typeface="PFDinTextCompPro-Italic"/>
+              </a:rPr>
+              <a:t>: When actual value is </a:t>
+            </a:r>
+            <a:r>
+              <a:rPr lang="en-US" sz="2400" b="1" smtClean="0">
+                <a:latin typeface="PFDinTextCompPro-Italic"/>
+                <a:cs typeface="PFDinTextCompPro-Italic"/>
+              </a:rPr>
+              <a:t>ham</a:t>
+            </a:r>
+            <a:r>
+              <a:rPr lang="en-US" sz="2400" smtClean="0">
+                <a:latin typeface="PFDinTextCompPro-Italic"/>
+                <a:cs typeface="PFDinTextCompPro-Italic"/>
+              </a:rPr>
+              <a:t>, how often is prediction </a:t>
+            </a:r>
+            <a:r>
+              <a:rPr lang="en-US" sz="2400" b="1" smtClean="0">
+                <a:latin typeface="PFDinTextCompPro-Italic"/>
+                <a:cs typeface="PFDinTextCompPro-Italic"/>
+              </a:rPr>
+              <a:t>wrong</a:t>
+            </a:r>
+            <a:r>
+              <a:rPr lang="en-US" sz="2400" smtClean="0">
+                <a:latin typeface="PFDinTextCompPro-Italic"/>
+                <a:cs typeface="PFDinTextCompPro-Italic"/>
+              </a:rPr>
+              <a:t>?</a:t>
+            </a:r>
+            <a:endParaRPr lang="en-US" sz="2400" dirty="0" smtClean="0">
+              <a:latin typeface="PFDinTextCompPro-Italic"/>
+              <a:cs typeface="PFDinTextCompPro-Italic"/>
+            </a:endParaRPr>
+          </a:p>
+        </p:txBody>
+      </p:sp>
+      <p:sp>
+        <p:nvSpPr>
+          <p:cNvPr id="4" name="Content Placeholder 3"/>
+          <p:cNvSpPr>
+            <a:spLocks noGrp="1"/>
+          </p:cNvSpPr>
+          <p:nvPr>
+            <p:ph sz="quarter" idx="11"/>
+          </p:nvPr>
+        </p:nvSpPr>
+        <p:spPr>
+          <a:xfrm>
+            <a:off x="414337" y="495300"/>
+            <a:ext cx="6400800" cy="304800"/>
+          </a:xfrm>
+        </p:spPr>
+        <p:txBody>
+          <a:bodyPr/>
+          <a:lstStyle/>
+          <a:p>
+            <a:pPr eaLnBrk="1" hangingPunct="1">
+              <a:lnSpc>
+                <a:spcPts val="2448"/>
+              </a:lnSpc>
+              <a:defRPr/>
+            </a:pPr>
+            <a:r>
+              <a:rPr lang="en-US" smtClean="0"/>
+              <a:t>ROC Curve / AUC</a:t>
+            </a:r>
+            <a:endParaRPr lang="en-US" dirty="0"/>
+          </a:p>
+        </p:txBody>
+      </p:sp>
+      <p:sp>
+        <p:nvSpPr>
+          <p:cNvPr id="8" name="Slide Number Placeholder 3"/>
+          <p:cNvSpPr>
+            <a:spLocks noGrp="1"/>
+          </p:cNvSpPr>
+          <p:nvPr>
+            <p:ph type="sldNum" sz="quarter" idx="13"/>
+          </p:nvPr>
+        </p:nvSpPr>
+        <p:spPr/>
+        <p:txBody>
+          <a:bodyPr/>
+          <a:lstStyle/>
+          <a:p>
+            <a:pPr>
+              <a:defRPr/>
+            </a:pPr>
+            <a:fld id="{BD5AD749-DAD1-6A4A-A2AA-CB20EAD0AEB7}" type="slidenum">
+              <a:rPr lang="en-US"/>
+              <a:pPr>
+                <a:defRPr/>
+              </a:pPr>
+              <a:t>11</a:t>
+            </a:fld>
+            <a:endParaRPr lang="en-US"/>
+          </a:p>
+        </p:txBody>
+      </p:sp>
+      <p:graphicFrame>
+        <p:nvGraphicFramePr>
+          <p:cNvPr id="2" name="Table 1"/>
+          <p:cNvGraphicFramePr>
+            <a:graphicFrameLocks noGrp="1"/>
+          </p:cNvGraphicFramePr>
+          <p:nvPr>
+            <p:extLst>
+              <p:ext uri="{D42A27DB-BD31-4B8C-83A1-F6EECF244321}">
+                <p14:modId xmlns:p14="http://schemas.microsoft.com/office/powerpoint/2010/main" val="4072707114"/>
+              </p:ext>
+            </p:extLst>
+          </p:nvPr>
+        </p:nvGraphicFramePr>
+        <p:xfrm>
+          <a:off x="719137" y="1257300"/>
+          <a:ext cx="2663826" cy="3454400"/>
+        </p:xfrm>
+        <a:graphic>
+          <a:graphicData uri="http://schemas.openxmlformats.org/drawingml/2006/table">
+            <a:tbl>
+              <a:tblPr firstRow="1" bandRow="1">
+                <a:tableStyleId>{5C22544A-7EE6-4342-B048-85BDC9FD1C3A}</a:tableStyleId>
+              </a:tblPr>
+              <a:tblGrid>
+                <a:gridCol w="887942"/>
+                <a:gridCol w="887942"/>
+                <a:gridCol w="887942"/>
+              </a:tblGrid>
+              <a:tr h="370840">
+                <a:tc>
+                  <a:txBody>
+                    <a:bodyPr/>
+                    <a:lstStyle/>
+                    <a:p>
+                      <a:r>
+                        <a:rPr lang="en-US" dirty="0" smtClean="0"/>
+                        <a:t>Email Number</a:t>
+                      </a:r>
+                      <a:endParaRPr lang="en-US" dirty="0"/>
+                    </a:p>
+                  </a:txBody>
+                  <a:tcPr/>
+                </a:tc>
+                <a:tc>
+                  <a:txBody>
+                    <a:bodyPr/>
+                    <a:lstStyle/>
+                    <a:p>
+                      <a:r>
+                        <a:rPr lang="en-US" dirty="0" smtClean="0"/>
+                        <a:t>Score</a:t>
+                      </a:r>
+                      <a:endParaRPr lang="en-US" dirty="0"/>
+                    </a:p>
+                  </a:txBody>
+                  <a:tcPr/>
+                </a:tc>
+                <a:tc>
+                  <a:txBody>
+                    <a:bodyPr/>
+                    <a:lstStyle/>
+                    <a:p>
+                      <a:r>
+                        <a:rPr lang="en-US" dirty="0" smtClean="0"/>
+                        <a:t>True Label</a:t>
+                      </a:r>
+                      <a:endParaRPr lang="en-US" dirty="0"/>
+                    </a:p>
+                  </a:txBody>
+                  <a:tcPr/>
+                </a:tc>
+              </a:tr>
+              <a:tr h="370840">
+                <a:tc>
+                  <a:txBody>
+                    <a:bodyPr/>
+                    <a:lstStyle/>
+                    <a:p>
+                      <a:r>
+                        <a:rPr lang="en-US" dirty="0" smtClean="0"/>
+                        <a:t>5</a:t>
+                      </a:r>
+                    </a:p>
+                  </a:txBody>
+                  <a:tcPr/>
+                </a:tc>
+                <a:tc>
+                  <a:txBody>
+                    <a:bodyPr/>
+                    <a:lstStyle/>
+                    <a:p>
+                      <a:r>
+                        <a:rPr lang="en-US" smtClean="0"/>
+                        <a:t>0.99</a:t>
+                      </a:r>
+                      <a:endParaRPr lang="en-US" dirty="0"/>
+                    </a:p>
+                  </a:txBody>
+                  <a:tcPr/>
+                </a:tc>
+                <a:tc>
+                  <a:txBody>
+                    <a:bodyPr/>
+                    <a:lstStyle/>
+                    <a:p>
+                      <a:r>
+                        <a:rPr lang="en-US" dirty="0" smtClean="0"/>
+                        <a:t>Spam</a:t>
+                      </a:r>
+                      <a:endParaRPr lang="en-US" dirty="0"/>
+                    </a:p>
+                  </a:txBody>
+                  <a:tcPr/>
+                </a:tc>
+              </a:tr>
+              <a:tr h="370840">
+                <a:tc>
+                  <a:txBody>
+                    <a:bodyPr/>
+                    <a:lstStyle/>
+                    <a:p>
+                      <a:r>
+                        <a:rPr lang="en-US" dirty="0" smtClean="0"/>
+                        <a:t>8</a:t>
+                      </a:r>
+                      <a:endParaRPr lang="en-US" dirty="0"/>
+                    </a:p>
+                  </a:txBody>
+                  <a:tcPr/>
+                </a:tc>
+                <a:tc>
+                  <a:txBody>
+                    <a:bodyPr/>
+                    <a:lstStyle/>
+                    <a:p>
+                      <a:r>
+                        <a:rPr lang="en-US" smtClean="0"/>
+                        <a:t>0.82</a:t>
+                      </a:r>
+                      <a:endParaRPr lang="en-US" dirty="0"/>
+                    </a:p>
+                  </a:txBody>
+                  <a:tcPr/>
+                </a:tc>
+                <a:tc>
+                  <a:txBody>
+                    <a:bodyPr/>
+                    <a:lstStyle/>
+                    <a:p>
+                      <a:r>
+                        <a:rPr lang="en-US" dirty="0" smtClean="0"/>
+                        <a:t>Spam</a:t>
+                      </a:r>
+                      <a:endParaRPr lang="en-US" dirty="0"/>
+                    </a:p>
+                  </a:txBody>
+                  <a:tcPr/>
+                </a:tc>
+              </a:tr>
+              <a:tr h="370840">
+                <a:tc>
+                  <a:txBody>
+                    <a:bodyPr/>
+                    <a:lstStyle/>
+                    <a:p>
+                      <a:r>
+                        <a:rPr lang="en-US" dirty="0" smtClean="0"/>
+                        <a:t>2</a:t>
+                      </a:r>
+                      <a:endParaRPr lang="en-US" dirty="0"/>
+                    </a:p>
+                  </a:txBody>
+                  <a:tcPr/>
+                </a:tc>
+                <a:tc>
+                  <a:txBody>
+                    <a:bodyPr/>
+                    <a:lstStyle/>
+                    <a:p>
+                      <a:r>
+                        <a:rPr lang="en-US" smtClean="0"/>
+                        <a:t>0.60</a:t>
+                      </a:r>
+                      <a:endParaRPr lang="en-US" dirty="0"/>
+                    </a:p>
+                  </a:txBody>
+                  <a:tcPr/>
+                </a:tc>
+                <a:tc>
+                  <a:txBody>
+                    <a:bodyPr/>
+                    <a:lstStyle/>
+                    <a:p>
+                      <a:r>
+                        <a:rPr lang="en-US" dirty="0" smtClean="0"/>
+                        <a:t>Spam</a:t>
+                      </a:r>
+                      <a:endParaRPr lang="en-US" dirty="0"/>
+                    </a:p>
+                  </a:txBody>
+                  <a:tcPr/>
+                </a:tc>
+              </a:tr>
+              <a:tr h="370840">
+                <a:tc>
+                  <a:txBody>
+                    <a:bodyPr/>
+                    <a:lstStyle/>
+                    <a:p>
+                      <a:r>
+                        <a:rPr lang="en-US" dirty="0" smtClean="0"/>
+                        <a:t>1</a:t>
+                      </a:r>
+                      <a:endParaRPr lang="en-US" dirty="0"/>
+                    </a:p>
+                  </a:txBody>
+                  <a:tcPr/>
+                </a:tc>
+                <a:tc>
+                  <a:txBody>
+                    <a:bodyPr/>
+                    <a:lstStyle/>
+                    <a:p>
+                      <a:r>
+                        <a:rPr lang="en-US" smtClean="0"/>
+                        <a:t>0.60</a:t>
+                      </a:r>
+                      <a:endParaRPr lang="en-US" dirty="0"/>
+                    </a:p>
+                  </a:txBody>
+                  <a:tcPr/>
+                </a:tc>
+                <a:tc>
+                  <a:txBody>
+                    <a:bodyPr/>
+                    <a:lstStyle/>
+                    <a:p>
+                      <a:r>
+                        <a:rPr lang="en-US" dirty="0" smtClean="0"/>
+                        <a:t>Ham</a:t>
+                      </a:r>
+                      <a:endParaRPr lang="en-US" dirty="0"/>
+                    </a:p>
+                  </a:txBody>
+                  <a:tcPr/>
+                </a:tc>
+              </a:tr>
+              <a:tr h="370840">
+                <a:tc>
+                  <a:txBody>
+                    <a:bodyPr/>
+                    <a:lstStyle/>
+                    <a:p>
+                      <a:r>
+                        <a:rPr lang="en-US" dirty="0" smtClean="0"/>
+                        <a:t>7</a:t>
+                      </a:r>
+                      <a:endParaRPr lang="en-US" dirty="0"/>
+                    </a:p>
+                  </a:txBody>
+                  <a:tcPr/>
+                </a:tc>
+                <a:tc>
+                  <a:txBody>
+                    <a:bodyPr/>
+                    <a:lstStyle/>
+                    <a:p>
+                      <a:r>
+                        <a:rPr lang="en-US" smtClean="0"/>
+                        <a:t>0.48</a:t>
+                      </a:r>
+                      <a:endParaRPr lang="en-US" dirty="0"/>
+                    </a:p>
+                  </a:txBody>
+                  <a:tcPr/>
+                </a:tc>
+                <a:tc>
+                  <a:txBody>
+                    <a:bodyPr/>
+                    <a:lstStyle/>
+                    <a:p>
+                      <a:r>
+                        <a:rPr lang="en-US" dirty="0" smtClean="0"/>
+                        <a:t>Spam</a:t>
+                      </a:r>
+                      <a:endParaRPr lang="en-US" dirty="0"/>
+                    </a:p>
+                  </a:txBody>
+                  <a:tcPr/>
+                </a:tc>
+              </a:tr>
+              <a:tr h="370840">
+                <a:tc>
+                  <a:txBody>
+                    <a:bodyPr/>
+                    <a:lstStyle/>
+                    <a:p>
+                      <a:r>
+                        <a:rPr lang="en-US" dirty="0" smtClean="0"/>
+                        <a:t>3</a:t>
+                      </a:r>
+                      <a:endParaRPr lang="en-US" dirty="0"/>
+                    </a:p>
+                  </a:txBody>
+                  <a:tcPr/>
+                </a:tc>
+                <a:tc>
+                  <a:txBody>
+                    <a:bodyPr/>
+                    <a:lstStyle/>
+                    <a:p>
+                      <a:r>
+                        <a:rPr lang="en-US" dirty="0" smtClean="0"/>
+                        <a:t>0.22</a:t>
+                      </a:r>
+                      <a:endParaRPr lang="en-US" dirty="0"/>
+                    </a:p>
+                  </a:txBody>
+                  <a:tcPr/>
+                </a:tc>
+                <a:tc>
+                  <a:txBody>
+                    <a:bodyPr/>
+                    <a:lstStyle/>
+                    <a:p>
+                      <a:r>
+                        <a:rPr lang="en-US" dirty="0" smtClean="0"/>
+                        <a:t>Ham</a:t>
+                      </a:r>
+                      <a:endParaRPr lang="en-US" dirty="0"/>
+                    </a:p>
+                  </a:txBody>
+                  <a:tcPr/>
+                </a:tc>
+              </a:tr>
+              <a:tr h="370840">
+                <a:tc>
+                  <a:txBody>
+                    <a:bodyPr/>
+                    <a:lstStyle/>
+                    <a:p>
+                      <a:r>
+                        <a:rPr lang="en-US" dirty="0" smtClean="0"/>
+                        <a:t>4</a:t>
+                      </a:r>
+                      <a:endParaRPr lang="en-US" dirty="0"/>
+                    </a:p>
+                  </a:txBody>
+                  <a:tcPr/>
+                </a:tc>
+                <a:tc>
+                  <a:txBody>
+                    <a:bodyPr/>
+                    <a:lstStyle/>
+                    <a:p>
+                      <a:r>
+                        <a:rPr lang="en-US" dirty="0" smtClean="0"/>
+                        <a:t>0.10</a:t>
+                      </a:r>
+                      <a:endParaRPr lang="en-US" dirty="0"/>
+                    </a:p>
+                  </a:txBody>
+                  <a:tcPr/>
+                </a:tc>
+                <a:tc>
+                  <a:txBody>
+                    <a:bodyPr/>
+                    <a:lstStyle/>
+                    <a:p>
+                      <a:r>
+                        <a:rPr lang="en-US" dirty="0" smtClean="0"/>
+                        <a:t>Ham</a:t>
+                      </a:r>
+                      <a:endParaRPr lang="en-US" dirty="0"/>
+                    </a:p>
+                  </a:txBody>
+                  <a:tcPr/>
+                </a:tc>
+              </a:tr>
+              <a:tr h="370840">
+                <a:tc>
+                  <a:txBody>
+                    <a:bodyPr/>
+                    <a:lstStyle/>
+                    <a:p>
+                      <a:r>
+                        <a:rPr lang="en-US" dirty="0" smtClean="0"/>
+                        <a:t>6</a:t>
+                      </a:r>
+                      <a:endParaRPr lang="en-US" dirty="0"/>
+                    </a:p>
+                  </a:txBody>
+                  <a:tcPr/>
+                </a:tc>
+                <a:tc>
+                  <a:txBody>
+                    <a:bodyPr/>
+                    <a:lstStyle/>
+                    <a:p>
+                      <a:r>
+                        <a:rPr lang="en-US" dirty="0" smtClean="0"/>
+                        <a:t>0.02</a:t>
+                      </a:r>
+                      <a:endParaRPr lang="en-US" dirty="0"/>
+                    </a:p>
+                  </a:txBody>
+                  <a:tcPr/>
+                </a:tc>
+                <a:tc>
+                  <a:txBody>
+                    <a:bodyPr/>
+                    <a:lstStyle/>
+                    <a:p>
+                      <a:r>
+                        <a:rPr lang="en-US" dirty="0" smtClean="0"/>
+                        <a:t>Ham</a:t>
+                      </a:r>
+                      <a:endParaRPr lang="en-US" dirty="0"/>
+                    </a:p>
+                  </a:txBody>
+                  <a:tcPr/>
+                </a:tc>
+              </a:tr>
+            </a:tbl>
+          </a:graphicData>
+        </a:graphic>
+      </p:graphicFrame>
+      <p:graphicFrame>
+        <p:nvGraphicFramePr>
+          <p:cNvPr id="6" name="Table 5"/>
+          <p:cNvGraphicFramePr>
+            <a:graphicFrameLocks noGrp="1"/>
+          </p:cNvGraphicFramePr>
+          <p:nvPr>
+            <p:extLst>
+              <p:ext uri="{D42A27DB-BD31-4B8C-83A1-F6EECF244321}">
+                <p14:modId xmlns:p14="http://schemas.microsoft.com/office/powerpoint/2010/main" val="411801836"/>
+              </p:ext>
+            </p:extLst>
+          </p:nvPr>
+        </p:nvGraphicFramePr>
+        <p:xfrm>
+          <a:off x="3843337" y="3238500"/>
+          <a:ext cx="4648200" cy="1447800"/>
+        </p:xfrm>
+        <a:graphic>
+          <a:graphicData uri="http://schemas.openxmlformats.org/drawingml/2006/table">
+            <a:tbl>
+              <a:tblPr firstRow="1" bandRow="1">
+                <a:tableStyleId>{5C22544A-7EE6-4342-B048-85BDC9FD1C3A}</a:tableStyleId>
+              </a:tblPr>
+              <a:tblGrid>
+                <a:gridCol w="685800"/>
+                <a:gridCol w="773349"/>
+                <a:gridCol w="826851"/>
+                <a:gridCol w="685800"/>
+                <a:gridCol w="838200"/>
+                <a:gridCol w="838200"/>
+              </a:tblGrid>
+              <a:tr h="266492">
+                <a:tc>
+                  <a:txBody>
+                    <a:bodyPr/>
+                    <a:lstStyle/>
+                    <a:p>
+                      <a:r>
+                        <a:rPr lang="en-US" smtClean="0"/>
+                        <a:t>Cutoff</a:t>
+                      </a:r>
+                      <a:endParaRPr lang="en-US"/>
+                    </a:p>
+                  </a:txBody>
+                  <a:tcPr/>
+                </a:tc>
+                <a:tc>
+                  <a:txBody>
+                    <a:bodyPr/>
+                    <a:lstStyle/>
+                    <a:p>
+                      <a:r>
+                        <a:rPr lang="en-US" smtClean="0"/>
+                        <a:t>TPR (y)</a:t>
+                      </a:r>
+                      <a:endParaRPr lang="en-US"/>
+                    </a:p>
+                  </a:txBody>
+                  <a:tcPr/>
+                </a:tc>
+                <a:tc>
+                  <a:txBody>
+                    <a:bodyPr/>
+                    <a:lstStyle/>
+                    <a:p>
+                      <a:r>
+                        <a:rPr lang="en-US" smtClean="0"/>
+                        <a:t>FPR (x)</a:t>
+                      </a:r>
+                      <a:endParaRPr lang="en-US"/>
+                    </a:p>
+                  </a:txBody>
+                  <a:tcPr/>
+                </a:tc>
+                <a:tc>
+                  <a:txBody>
+                    <a:bodyPr/>
+                    <a:lstStyle/>
+                    <a:p>
+                      <a:r>
+                        <a:rPr lang="en-US" smtClean="0"/>
+                        <a:t>Cutoff</a:t>
+                      </a:r>
+                      <a:endParaRPr lang="en-US"/>
+                    </a:p>
+                  </a:txBody>
+                  <a:tcPr/>
+                </a:tc>
+                <a:tc>
+                  <a:txBody>
+                    <a:bodyPr/>
+                    <a:lstStyle/>
+                    <a:p>
+                      <a:r>
+                        <a:rPr lang="en-US" smtClean="0"/>
+                        <a:t>TPR (y)</a:t>
+                      </a:r>
+                      <a:endParaRPr lang="en-US"/>
+                    </a:p>
+                  </a:txBody>
+                  <a:tcPr/>
+                </a:tc>
+                <a:tc>
+                  <a:txBody>
+                    <a:bodyPr/>
+                    <a:lstStyle/>
+                    <a:p>
+                      <a:r>
+                        <a:rPr lang="en-US" smtClean="0"/>
+                        <a:t>FPR (x)</a:t>
+                      </a:r>
+                      <a:endParaRPr lang="en-US"/>
+                    </a:p>
+                  </a:txBody>
+                  <a:tcPr/>
+                </a:tc>
+              </a:tr>
+              <a:tr h="266492">
+                <a:tc>
+                  <a:txBody>
+                    <a:bodyPr/>
+                    <a:lstStyle/>
+                    <a:p>
+                      <a:r>
+                        <a:rPr lang="en-US" b="1" smtClean="0"/>
+                        <a:t>0</a:t>
+                      </a:r>
+                      <a:endParaRPr lang="en-US" b="1"/>
+                    </a:p>
+                  </a:txBody>
+                  <a:tcPr/>
+                </a:tc>
+                <a:tc>
+                  <a:txBody>
+                    <a:bodyPr/>
+                    <a:lstStyle/>
+                    <a:p>
+                      <a:r>
+                        <a:rPr lang="en-US" smtClean="0"/>
+                        <a:t>1</a:t>
+                      </a:r>
+                      <a:endParaRPr lang="en-US"/>
+                    </a:p>
+                  </a:txBody>
+                  <a:tcPr/>
+                </a:tc>
+                <a:tc>
+                  <a:txBody>
+                    <a:bodyPr/>
+                    <a:lstStyle/>
+                    <a:p>
+                      <a:r>
+                        <a:rPr lang="en-US" smtClean="0"/>
+                        <a:t>1</a:t>
+                      </a:r>
+                      <a:endParaRPr lang="en-US"/>
+                    </a:p>
+                  </a:txBody>
+                  <a:tcPr/>
+                </a:tc>
+                <a:tc>
+                  <a:txBody>
+                    <a:bodyPr/>
+                    <a:lstStyle/>
+                    <a:p>
+                      <a:r>
+                        <a:rPr lang="en-US" b="1" smtClean="0"/>
+                        <a:t>0.50</a:t>
+                      </a:r>
+                      <a:endParaRPr lang="en-US" b="1"/>
+                    </a:p>
+                  </a:txBody>
+                  <a:tcPr/>
+                </a:tc>
+                <a:tc>
+                  <a:txBody>
+                    <a:bodyPr/>
+                    <a:lstStyle/>
+                    <a:p>
+                      <a:r>
+                        <a:rPr lang="en-US" smtClean="0"/>
+                        <a:t>0.75</a:t>
+                      </a:r>
+                      <a:endParaRPr lang="en-US"/>
+                    </a:p>
+                  </a:txBody>
+                  <a:tcPr/>
+                </a:tc>
+                <a:tc>
+                  <a:txBody>
+                    <a:bodyPr/>
+                    <a:lstStyle/>
+                    <a:p>
+                      <a:r>
+                        <a:rPr lang="en-US" smtClean="0"/>
+                        <a:t>0.25</a:t>
+                      </a:r>
+                      <a:endParaRPr lang="en-US"/>
+                    </a:p>
+                  </a:txBody>
+                  <a:tcPr/>
+                </a:tc>
+              </a:tr>
+              <a:tr h="266492">
+                <a:tc>
+                  <a:txBody>
+                    <a:bodyPr/>
+                    <a:lstStyle/>
+                    <a:p>
+                      <a:r>
+                        <a:rPr lang="en-US" b="1" smtClean="0"/>
+                        <a:t>0.05</a:t>
+                      </a:r>
+                      <a:endParaRPr lang="en-US" b="1"/>
+                    </a:p>
+                  </a:txBody>
+                  <a:tcPr/>
+                </a:tc>
+                <a:tc>
+                  <a:txBody>
+                    <a:bodyPr/>
+                    <a:lstStyle/>
+                    <a:p>
+                      <a:r>
+                        <a:rPr lang="en-US" smtClean="0"/>
+                        <a:t>1</a:t>
+                      </a:r>
+                      <a:endParaRPr lang="en-US"/>
+                    </a:p>
+                  </a:txBody>
+                  <a:tcPr/>
+                </a:tc>
+                <a:tc>
+                  <a:txBody>
+                    <a:bodyPr/>
+                    <a:lstStyle/>
+                    <a:p>
+                      <a:r>
+                        <a:rPr lang="en-US" smtClean="0"/>
+                        <a:t>0.75</a:t>
+                      </a:r>
+                      <a:endParaRPr lang="en-US"/>
+                    </a:p>
+                  </a:txBody>
+                  <a:tcPr/>
+                </a:tc>
+                <a:tc>
+                  <a:txBody>
+                    <a:bodyPr/>
+                    <a:lstStyle/>
+                    <a:p>
+                      <a:r>
+                        <a:rPr lang="en-US" b="1" smtClean="0"/>
+                        <a:t>0.65</a:t>
+                      </a:r>
+                      <a:endParaRPr lang="en-US" b="1"/>
+                    </a:p>
+                  </a:txBody>
+                  <a:tcPr/>
+                </a:tc>
+                <a:tc>
+                  <a:txBody>
+                    <a:bodyPr/>
+                    <a:lstStyle/>
+                    <a:p>
+                      <a:r>
+                        <a:rPr lang="en-US" smtClean="0"/>
+                        <a:t>0.5</a:t>
+                      </a:r>
+                      <a:endParaRPr lang="en-US"/>
+                    </a:p>
+                  </a:txBody>
+                  <a:tcPr/>
+                </a:tc>
+                <a:tc>
+                  <a:txBody>
+                    <a:bodyPr/>
+                    <a:lstStyle/>
+                    <a:p>
+                      <a:r>
+                        <a:rPr lang="en-US" smtClean="0"/>
+                        <a:t>0</a:t>
+                      </a:r>
+                      <a:endParaRPr lang="en-US"/>
+                    </a:p>
+                  </a:txBody>
+                  <a:tcPr/>
+                </a:tc>
+              </a:tr>
+              <a:tr h="266492">
+                <a:tc>
+                  <a:txBody>
+                    <a:bodyPr/>
+                    <a:lstStyle/>
+                    <a:p>
+                      <a:r>
+                        <a:rPr lang="en-US" b="1" smtClean="0"/>
+                        <a:t>0.15</a:t>
+                      </a:r>
+                      <a:endParaRPr lang="en-US" b="1"/>
+                    </a:p>
+                  </a:txBody>
+                  <a:tcPr/>
+                </a:tc>
+                <a:tc>
+                  <a:txBody>
+                    <a:bodyPr/>
+                    <a:lstStyle/>
+                    <a:p>
+                      <a:r>
+                        <a:rPr lang="en-US" smtClean="0"/>
+                        <a:t>1</a:t>
+                      </a:r>
+                      <a:endParaRPr lang="en-US"/>
+                    </a:p>
+                  </a:txBody>
+                  <a:tcPr/>
+                </a:tc>
+                <a:tc>
+                  <a:txBody>
+                    <a:bodyPr/>
+                    <a:lstStyle/>
+                    <a:p>
+                      <a:r>
+                        <a:rPr lang="en-US" smtClean="0"/>
+                        <a:t>0.5</a:t>
+                      </a:r>
+                      <a:endParaRPr lang="en-US"/>
+                    </a:p>
+                  </a:txBody>
+                  <a:tcPr/>
+                </a:tc>
+                <a:tc>
+                  <a:txBody>
+                    <a:bodyPr/>
+                    <a:lstStyle/>
+                    <a:p>
+                      <a:r>
+                        <a:rPr lang="en-US" b="1" smtClean="0"/>
+                        <a:t>0.85</a:t>
+                      </a:r>
+                      <a:endParaRPr lang="en-US" b="1"/>
+                    </a:p>
+                  </a:txBody>
+                  <a:tcPr/>
+                </a:tc>
+                <a:tc>
+                  <a:txBody>
+                    <a:bodyPr/>
+                    <a:lstStyle/>
+                    <a:p>
+                      <a:r>
+                        <a:rPr lang="en-US" smtClean="0"/>
+                        <a:t>0.25</a:t>
+                      </a:r>
+                      <a:endParaRPr lang="en-US"/>
+                    </a:p>
+                  </a:txBody>
+                  <a:tcPr/>
+                </a:tc>
+                <a:tc>
+                  <a:txBody>
+                    <a:bodyPr/>
+                    <a:lstStyle/>
+                    <a:p>
+                      <a:r>
+                        <a:rPr lang="en-US" smtClean="0"/>
+                        <a:t>0</a:t>
+                      </a:r>
+                      <a:endParaRPr lang="en-US"/>
+                    </a:p>
+                  </a:txBody>
+                  <a:tcPr/>
+                </a:tc>
+              </a:tr>
+              <a:tr h="266492">
+                <a:tc>
+                  <a:txBody>
+                    <a:bodyPr/>
+                    <a:lstStyle/>
+                    <a:p>
+                      <a:r>
+                        <a:rPr lang="en-US" b="1" smtClean="0"/>
+                        <a:t>0.25</a:t>
+                      </a:r>
+                      <a:endParaRPr lang="en-US" b="1"/>
+                    </a:p>
+                  </a:txBody>
+                  <a:tcPr/>
+                </a:tc>
+                <a:tc>
+                  <a:txBody>
+                    <a:bodyPr/>
+                    <a:lstStyle/>
+                    <a:p>
+                      <a:r>
+                        <a:rPr lang="en-US" smtClean="0"/>
+                        <a:t>1</a:t>
+                      </a:r>
+                      <a:endParaRPr lang="en-US"/>
+                    </a:p>
+                  </a:txBody>
+                  <a:tcPr/>
+                </a:tc>
+                <a:tc>
+                  <a:txBody>
+                    <a:bodyPr/>
+                    <a:lstStyle/>
+                    <a:p>
+                      <a:r>
+                        <a:rPr lang="en-US" smtClean="0"/>
+                        <a:t>0.25</a:t>
+                      </a:r>
+                      <a:endParaRPr lang="en-US"/>
+                    </a:p>
+                  </a:txBody>
+                  <a:tcPr/>
+                </a:tc>
+                <a:tc>
+                  <a:txBody>
+                    <a:bodyPr/>
+                    <a:lstStyle/>
+                    <a:p>
+                      <a:r>
+                        <a:rPr lang="en-US" b="1" smtClean="0"/>
+                        <a:t>1</a:t>
+                      </a:r>
+                      <a:endParaRPr lang="en-US" b="1"/>
+                    </a:p>
+                  </a:txBody>
+                  <a:tcPr/>
+                </a:tc>
+                <a:tc>
+                  <a:txBody>
+                    <a:bodyPr/>
+                    <a:lstStyle/>
+                    <a:p>
+                      <a:r>
+                        <a:rPr lang="en-US" smtClean="0"/>
+                        <a:t>0</a:t>
+                      </a:r>
+                      <a:endParaRPr lang="en-US"/>
+                    </a:p>
+                  </a:txBody>
+                  <a:tcPr/>
+                </a:tc>
+                <a:tc>
+                  <a:txBody>
+                    <a:bodyPr/>
+                    <a:lstStyle/>
+                    <a:p>
+                      <a:r>
+                        <a:rPr lang="en-US" smtClean="0"/>
+                        <a:t>0</a:t>
+                      </a:r>
+                      <a:endParaRPr lang="en-US"/>
+                    </a:p>
+                  </a:txBody>
+                  <a:tcPr/>
+                </a:tc>
+              </a:tr>
+            </a:tbl>
+          </a:graphicData>
+        </a:graphic>
+      </p:graphicFrame>
+    </p:spTree>
+    <p:extLst>
+      <p:ext uri="{BB962C8B-B14F-4D97-AF65-F5344CB8AC3E}">
+        <p14:creationId xmlns:p14="http://schemas.microsoft.com/office/powerpoint/2010/main" val="816760249"/>
+      </p:ext>
+    </p:extLst>
+  </p:cSld>
+  <p:clrMapOvr>
+    <a:masterClrMapping/>
+  </p:clrMapOvr>
+  <p:transition/>
+  <p:timing>
+    <p:tnLst>
+      <p:par>
+        <p:cTn id="1" dur="indefinite" restart="never" nodeType="tmRoot"/>
+      </p:par>
+    </p:tnLst>
+  </p:timing>
+</p:sld>
+</file>
+
+<file path=ppt/slides/slide12.xml><?xml version="1.0" encoding="utf-8"?>
+<p:sld xmlns:a="http://schemas.openxmlformats.org/drawingml/2006/main" xmlns:r="http://schemas.openxmlformats.org/officeDocument/2006/relationships" xmlns:p="http://schemas.openxmlformats.org/presentationml/2006/main">
+  <p:cSld>
+    <p:spTree>
+      <p:nvGrpSpPr>
+        <p:cNvPr id="1" name=""/>
+        <p:cNvGrpSpPr/>
+        <p:nvPr/>
+      </p:nvGrpSpPr>
+      <p:grpSpPr>
+        <a:xfrm>
+          <a:off x="0" y="0"/>
+          <a:ext cx="0" cy="0"/>
+          <a:chOff x="0" y="0"/>
+          <a:chExt cx="0" cy="0"/>
+        </a:xfrm>
+      </p:grpSpPr>
+      <p:sp>
+        <p:nvSpPr>
+          <p:cNvPr id="5" name="TextBox 4"/>
+          <p:cNvSpPr txBox="1"/>
+          <p:nvPr/>
+        </p:nvSpPr>
+        <p:spPr>
+          <a:xfrm>
+            <a:off x="3767137" y="1104900"/>
+            <a:ext cx="5029200" cy="3323987"/>
+          </a:xfrm>
+          <a:prstGeom prst="rect">
+            <a:avLst/>
+          </a:prstGeom>
+          <a:noFill/>
+        </p:spPr>
+        <p:txBody>
+          <a:bodyPr wrap="square" rtlCol="0">
+            <a:spAutoFit/>
+          </a:bodyPr>
+          <a:lstStyle/>
+          <a:p>
+            <a:pPr algn="l"/>
+            <a:r>
+              <a:rPr lang="en-US" sz="3000" smtClean="0">
+                <a:latin typeface="PFDinTextCompPro-Italic"/>
+                <a:cs typeface="PFDinTextCompPro-Italic"/>
+              </a:rPr>
+              <a:t>Q: Would the ROC Curve (and AUC) change if the </a:t>
+            </a:r>
+            <a:r>
+              <a:rPr lang="en-US" sz="3000" b="1" smtClean="0">
+                <a:latin typeface="PFDinTextCompPro-Italic"/>
+                <a:cs typeface="PFDinTextCompPro-Italic"/>
+              </a:rPr>
+              <a:t>scores</a:t>
+            </a:r>
+            <a:r>
+              <a:rPr lang="en-US" sz="3000" smtClean="0">
+                <a:latin typeface="PFDinTextCompPro-Italic"/>
+                <a:cs typeface="PFDinTextCompPro-Italic"/>
+              </a:rPr>
+              <a:t> changed but the </a:t>
+            </a:r>
+            <a:r>
+              <a:rPr lang="en-US" sz="3000" b="1" smtClean="0">
+                <a:latin typeface="PFDinTextCompPro-Italic"/>
+                <a:cs typeface="PFDinTextCompPro-Italic"/>
+              </a:rPr>
+              <a:t>ordering</a:t>
+            </a:r>
+            <a:r>
+              <a:rPr lang="en-US" sz="3000" smtClean="0">
+                <a:latin typeface="PFDinTextCompPro-Italic"/>
+                <a:cs typeface="PFDinTextCompPro-Italic"/>
+              </a:rPr>
+              <a:t> remained the same?</a:t>
+            </a:r>
+          </a:p>
+          <a:p>
+            <a:pPr algn="l"/>
+            <a:endParaRPr lang="en-US" sz="3000" dirty="0">
+              <a:latin typeface="PFDinTextCompPro-Italic"/>
+              <a:cs typeface="PFDinTextCompPro-Italic"/>
+            </a:endParaRPr>
+          </a:p>
+          <a:p>
+            <a:pPr algn="l"/>
+            <a:r>
+              <a:rPr lang="en-US" sz="3000" smtClean="0">
+                <a:latin typeface="PFDinTextCompPro-Italic"/>
+                <a:cs typeface="PFDinTextCompPro-Italic"/>
+              </a:rPr>
+              <a:t>A: Not at all! The ROC Curve is only sensitive to </a:t>
+            </a:r>
+            <a:r>
+              <a:rPr lang="en-US" sz="3000" b="1" smtClean="0">
+                <a:latin typeface="PFDinTextCompPro-Italic"/>
+                <a:cs typeface="PFDinTextCompPro-Italic"/>
+              </a:rPr>
+              <a:t>rank ordering</a:t>
+            </a:r>
+            <a:r>
+              <a:rPr lang="en-US" sz="3000" smtClean="0">
+                <a:latin typeface="PFDinTextCompPro-Italic"/>
+                <a:cs typeface="PFDinTextCompPro-Italic"/>
+              </a:rPr>
+              <a:t> and does not require </a:t>
+            </a:r>
+            <a:r>
+              <a:rPr lang="en-US" sz="3000" b="1" smtClean="0">
+                <a:latin typeface="PFDinTextCompPro-Italic"/>
+                <a:cs typeface="PFDinTextCompPro-Italic"/>
+              </a:rPr>
+              <a:t>calibrated scores</a:t>
+            </a:r>
+            <a:r>
+              <a:rPr lang="en-US" sz="3000" smtClean="0">
+                <a:latin typeface="PFDinTextCompPro-Italic"/>
+                <a:cs typeface="PFDinTextCompPro-Italic"/>
+              </a:rPr>
+              <a:t>.</a:t>
+            </a:r>
+            <a:endParaRPr lang="en-US" sz="3000" dirty="0" smtClean="0">
+              <a:latin typeface="PFDinTextCompPro-Italic"/>
+              <a:cs typeface="PFDinTextCompPro-Italic"/>
+            </a:endParaRPr>
+          </a:p>
+        </p:txBody>
+      </p:sp>
+      <p:sp>
+        <p:nvSpPr>
+          <p:cNvPr id="4" name="Content Placeholder 3"/>
+          <p:cNvSpPr>
+            <a:spLocks noGrp="1"/>
+          </p:cNvSpPr>
+          <p:nvPr>
+            <p:ph sz="quarter" idx="11"/>
+          </p:nvPr>
+        </p:nvSpPr>
+        <p:spPr>
+          <a:xfrm>
+            <a:off x="414337" y="495300"/>
+            <a:ext cx="6400800" cy="304800"/>
+          </a:xfrm>
+        </p:spPr>
+        <p:txBody>
+          <a:bodyPr/>
+          <a:lstStyle/>
+          <a:p>
+            <a:pPr eaLnBrk="1" hangingPunct="1">
+              <a:lnSpc>
+                <a:spcPts val="2448"/>
+              </a:lnSpc>
+              <a:defRPr/>
+            </a:pPr>
+            <a:r>
+              <a:rPr lang="en-US" smtClean="0"/>
+              <a:t>ROC Curve / AUC</a:t>
+            </a:r>
+            <a:endParaRPr lang="en-US" dirty="0"/>
+          </a:p>
+        </p:txBody>
+      </p:sp>
+      <p:sp>
+        <p:nvSpPr>
+          <p:cNvPr id="8" name="Slide Number Placeholder 3"/>
+          <p:cNvSpPr>
+            <a:spLocks noGrp="1"/>
+          </p:cNvSpPr>
+          <p:nvPr>
+            <p:ph type="sldNum" sz="quarter" idx="13"/>
+          </p:nvPr>
+        </p:nvSpPr>
+        <p:spPr/>
+        <p:txBody>
+          <a:bodyPr/>
+          <a:lstStyle/>
+          <a:p>
+            <a:pPr>
+              <a:defRPr/>
+            </a:pPr>
+            <a:fld id="{BD5AD749-DAD1-6A4A-A2AA-CB20EAD0AEB7}" type="slidenum">
+              <a:rPr lang="en-US"/>
+              <a:pPr>
+                <a:defRPr/>
+              </a:pPr>
+              <a:t>12</a:t>
+            </a:fld>
+            <a:endParaRPr lang="en-US"/>
+          </a:p>
+        </p:txBody>
+      </p:sp>
+      <p:graphicFrame>
+        <p:nvGraphicFramePr>
+          <p:cNvPr id="2" name="Table 1"/>
+          <p:cNvGraphicFramePr>
+            <a:graphicFrameLocks noGrp="1"/>
+          </p:cNvGraphicFramePr>
+          <p:nvPr>
+            <p:extLst>
+              <p:ext uri="{D42A27DB-BD31-4B8C-83A1-F6EECF244321}">
+                <p14:modId xmlns:p14="http://schemas.microsoft.com/office/powerpoint/2010/main" val="723776756"/>
+              </p:ext>
+            </p:extLst>
+          </p:nvPr>
+        </p:nvGraphicFramePr>
+        <p:xfrm>
+          <a:off x="719137" y="1257300"/>
+          <a:ext cx="2663826" cy="3454400"/>
+        </p:xfrm>
+        <a:graphic>
+          <a:graphicData uri="http://schemas.openxmlformats.org/drawingml/2006/table">
+            <a:tbl>
+              <a:tblPr firstRow="1" bandRow="1">
+                <a:tableStyleId>{5C22544A-7EE6-4342-B048-85BDC9FD1C3A}</a:tableStyleId>
+              </a:tblPr>
+              <a:tblGrid>
+                <a:gridCol w="887942"/>
+                <a:gridCol w="887942"/>
+                <a:gridCol w="887942"/>
+              </a:tblGrid>
+              <a:tr h="370840">
+                <a:tc>
+                  <a:txBody>
+                    <a:bodyPr/>
+                    <a:lstStyle/>
+                    <a:p>
+                      <a:r>
+                        <a:rPr lang="en-US" dirty="0" smtClean="0"/>
+                        <a:t>Email Number</a:t>
+                      </a:r>
+                      <a:endParaRPr lang="en-US" dirty="0"/>
+                    </a:p>
+                  </a:txBody>
+                  <a:tcPr/>
+                </a:tc>
+                <a:tc>
+                  <a:txBody>
+                    <a:bodyPr/>
+                    <a:lstStyle/>
+                    <a:p>
+                      <a:r>
+                        <a:rPr lang="en-US" dirty="0" smtClean="0"/>
+                        <a:t>Score</a:t>
+                      </a:r>
+                      <a:endParaRPr lang="en-US" dirty="0"/>
+                    </a:p>
+                  </a:txBody>
+                  <a:tcPr/>
+                </a:tc>
+                <a:tc>
+                  <a:txBody>
+                    <a:bodyPr/>
+                    <a:lstStyle/>
+                    <a:p>
+                      <a:r>
+                        <a:rPr lang="en-US" dirty="0" smtClean="0"/>
+                        <a:t>True Label</a:t>
+                      </a:r>
+                      <a:endParaRPr lang="en-US" dirty="0"/>
+                    </a:p>
+                  </a:txBody>
+                  <a:tcPr/>
+                </a:tc>
+              </a:tr>
+              <a:tr h="370840">
+                <a:tc>
+                  <a:txBody>
+                    <a:bodyPr/>
+                    <a:lstStyle/>
+                    <a:p>
+                      <a:r>
+                        <a:rPr lang="en-US" dirty="0" smtClean="0"/>
+                        <a:t>5</a:t>
+                      </a:r>
+                    </a:p>
+                  </a:txBody>
+                  <a:tcPr/>
+                </a:tc>
+                <a:tc>
+                  <a:txBody>
+                    <a:bodyPr/>
+                    <a:lstStyle/>
+                    <a:p>
+                      <a:r>
+                        <a:rPr lang="en-US" smtClean="0"/>
+                        <a:t>0.99</a:t>
+                      </a:r>
+                      <a:endParaRPr lang="en-US" dirty="0"/>
+                    </a:p>
+                  </a:txBody>
+                  <a:tcPr/>
+                </a:tc>
+                <a:tc>
+                  <a:txBody>
+                    <a:bodyPr/>
+                    <a:lstStyle/>
+                    <a:p>
+                      <a:r>
+                        <a:rPr lang="en-US" dirty="0" smtClean="0"/>
+                        <a:t>Spam</a:t>
+                      </a:r>
+                      <a:endParaRPr lang="en-US" dirty="0"/>
+                    </a:p>
+                  </a:txBody>
+                  <a:tcPr/>
+                </a:tc>
+              </a:tr>
+              <a:tr h="370840">
+                <a:tc>
+                  <a:txBody>
+                    <a:bodyPr/>
+                    <a:lstStyle/>
+                    <a:p>
+                      <a:r>
+                        <a:rPr lang="en-US" dirty="0" smtClean="0"/>
+                        <a:t>8</a:t>
+                      </a:r>
+                      <a:endParaRPr lang="en-US" dirty="0"/>
+                    </a:p>
+                  </a:txBody>
+                  <a:tcPr/>
+                </a:tc>
+                <a:tc>
+                  <a:txBody>
+                    <a:bodyPr/>
+                    <a:lstStyle/>
+                    <a:p>
+                      <a:r>
+                        <a:rPr lang="en-US" smtClean="0"/>
+                        <a:t>0.98</a:t>
+                      </a:r>
+                      <a:endParaRPr lang="en-US" dirty="0"/>
+                    </a:p>
+                  </a:txBody>
+                  <a:tcPr/>
+                </a:tc>
+                <a:tc>
+                  <a:txBody>
+                    <a:bodyPr/>
+                    <a:lstStyle/>
+                    <a:p>
+                      <a:r>
+                        <a:rPr lang="en-US" dirty="0" smtClean="0"/>
+                        <a:t>Spam</a:t>
+                      </a:r>
+                      <a:endParaRPr lang="en-US" dirty="0"/>
+                    </a:p>
+                  </a:txBody>
+                  <a:tcPr/>
+                </a:tc>
+              </a:tr>
+              <a:tr h="370840">
+                <a:tc>
+                  <a:txBody>
+                    <a:bodyPr/>
+                    <a:lstStyle/>
+                    <a:p>
+                      <a:r>
+                        <a:rPr lang="en-US" dirty="0" smtClean="0"/>
+                        <a:t>2</a:t>
+                      </a:r>
+                      <a:endParaRPr lang="en-US" dirty="0"/>
+                    </a:p>
+                  </a:txBody>
+                  <a:tcPr/>
+                </a:tc>
+                <a:tc>
+                  <a:txBody>
+                    <a:bodyPr/>
+                    <a:lstStyle/>
+                    <a:p>
+                      <a:r>
+                        <a:rPr lang="en-US" smtClean="0"/>
+                        <a:t>0.97</a:t>
+                      </a:r>
+                      <a:endParaRPr lang="en-US" dirty="0"/>
+                    </a:p>
+                  </a:txBody>
+                  <a:tcPr/>
+                </a:tc>
+                <a:tc>
+                  <a:txBody>
+                    <a:bodyPr/>
+                    <a:lstStyle/>
+                    <a:p>
+                      <a:r>
+                        <a:rPr lang="en-US" dirty="0" smtClean="0"/>
+                        <a:t>Spam</a:t>
+                      </a:r>
+                      <a:endParaRPr lang="en-US" dirty="0"/>
+                    </a:p>
+                  </a:txBody>
+                  <a:tcPr/>
+                </a:tc>
+              </a:tr>
+              <a:tr h="370840">
+                <a:tc>
+                  <a:txBody>
+                    <a:bodyPr/>
+                    <a:lstStyle/>
+                    <a:p>
+                      <a:r>
+                        <a:rPr lang="en-US" dirty="0" smtClean="0"/>
+                        <a:t>1</a:t>
+                      </a:r>
+                      <a:endParaRPr lang="en-US" dirty="0"/>
+                    </a:p>
+                  </a:txBody>
+                  <a:tcPr/>
+                </a:tc>
+                <a:tc>
+                  <a:txBody>
+                    <a:bodyPr/>
+                    <a:lstStyle/>
+                    <a:p>
+                      <a:r>
+                        <a:rPr lang="en-US" smtClean="0"/>
+                        <a:t>0.97</a:t>
+                      </a:r>
+                      <a:endParaRPr lang="en-US" dirty="0"/>
+                    </a:p>
+                  </a:txBody>
+                  <a:tcPr/>
+                </a:tc>
+                <a:tc>
+                  <a:txBody>
+                    <a:bodyPr/>
+                    <a:lstStyle/>
+                    <a:p>
+                      <a:r>
+                        <a:rPr lang="en-US" dirty="0" smtClean="0"/>
+                        <a:t>Ham</a:t>
+                      </a:r>
+                      <a:endParaRPr lang="en-US" dirty="0"/>
+                    </a:p>
+                  </a:txBody>
+                  <a:tcPr/>
+                </a:tc>
+              </a:tr>
+              <a:tr h="370840">
+                <a:tc>
+                  <a:txBody>
+                    <a:bodyPr/>
+                    <a:lstStyle/>
+                    <a:p>
+                      <a:r>
+                        <a:rPr lang="en-US" dirty="0" smtClean="0"/>
+                        <a:t>7</a:t>
+                      </a:r>
+                      <a:endParaRPr lang="en-US" dirty="0"/>
+                    </a:p>
+                  </a:txBody>
+                  <a:tcPr/>
+                </a:tc>
+                <a:tc>
+                  <a:txBody>
+                    <a:bodyPr/>
+                    <a:lstStyle/>
+                    <a:p>
+                      <a:r>
+                        <a:rPr lang="en-US" smtClean="0"/>
+                        <a:t>0.96</a:t>
+                      </a:r>
+                      <a:endParaRPr lang="en-US" dirty="0"/>
+                    </a:p>
+                  </a:txBody>
+                  <a:tcPr/>
+                </a:tc>
+                <a:tc>
+                  <a:txBody>
+                    <a:bodyPr/>
+                    <a:lstStyle/>
+                    <a:p>
+                      <a:r>
+                        <a:rPr lang="en-US" dirty="0" smtClean="0"/>
+                        <a:t>Spam</a:t>
+                      </a:r>
+                      <a:endParaRPr lang="en-US" dirty="0"/>
+                    </a:p>
+                  </a:txBody>
+                  <a:tcPr/>
+                </a:tc>
+              </a:tr>
+              <a:tr h="370840">
+                <a:tc>
+                  <a:txBody>
+                    <a:bodyPr/>
+                    <a:lstStyle/>
+                    <a:p>
+                      <a:r>
+                        <a:rPr lang="en-US" dirty="0" smtClean="0"/>
+                        <a:t>3</a:t>
+                      </a:r>
+                      <a:endParaRPr lang="en-US" dirty="0"/>
+                    </a:p>
+                  </a:txBody>
+                  <a:tcPr/>
+                </a:tc>
+                <a:tc>
+                  <a:txBody>
+                    <a:bodyPr/>
+                    <a:lstStyle/>
+                    <a:p>
+                      <a:r>
+                        <a:rPr lang="en-US" smtClean="0"/>
+                        <a:t>0.95</a:t>
+                      </a:r>
+                      <a:endParaRPr lang="en-US" dirty="0"/>
+                    </a:p>
+                  </a:txBody>
+                  <a:tcPr/>
+                </a:tc>
+                <a:tc>
+                  <a:txBody>
+                    <a:bodyPr/>
+                    <a:lstStyle/>
+                    <a:p>
+                      <a:r>
+                        <a:rPr lang="en-US" dirty="0" smtClean="0"/>
+                        <a:t>Ham</a:t>
+                      </a:r>
+                      <a:endParaRPr lang="en-US" dirty="0"/>
+                    </a:p>
+                  </a:txBody>
+                  <a:tcPr/>
+                </a:tc>
+              </a:tr>
+              <a:tr h="370840">
+                <a:tc>
+                  <a:txBody>
+                    <a:bodyPr/>
+                    <a:lstStyle/>
+                    <a:p>
+                      <a:r>
+                        <a:rPr lang="en-US" dirty="0" smtClean="0"/>
+                        <a:t>4</a:t>
+                      </a:r>
+                      <a:endParaRPr lang="en-US" dirty="0"/>
+                    </a:p>
+                  </a:txBody>
+                  <a:tcPr/>
+                </a:tc>
+                <a:tc>
+                  <a:txBody>
+                    <a:bodyPr/>
+                    <a:lstStyle/>
+                    <a:p>
+                      <a:r>
+                        <a:rPr lang="en-US" smtClean="0"/>
+                        <a:t>0.94</a:t>
+                      </a:r>
+                      <a:endParaRPr lang="en-US" dirty="0"/>
+                    </a:p>
+                  </a:txBody>
+                  <a:tcPr/>
+                </a:tc>
+                <a:tc>
+                  <a:txBody>
+                    <a:bodyPr/>
+                    <a:lstStyle/>
+                    <a:p>
+                      <a:r>
+                        <a:rPr lang="en-US" dirty="0" smtClean="0"/>
+                        <a:t>Ham</a:t>
+                      </a:r>
+                      <a:endParaRPr lang="en-US" dirty="0"/>
+                    </a:p>
+                  </a:txBody>
+                  <a:tcPr/>
+                </a:tc>
+              </a:tr>
+              <a:tr h="370840">
+                <a:tc>
+                  <a:txBody>
+                    <a:bodyPr/>
+                    <a:lstStyle/>
+                    <a:p>
+                      <a:r>
+                        <a:rPr lang="en-US" dirty="0" smtClean="0"/>
+                        <a:t>6</a:t>
+                      </a:r>
+                      <a:endParaRPr lang="en-US" dirty="0"/>
+                    </a:p>
+                  </a:txBody>
+                  <a:tcPr/>
+                </a:tc>
+                <a:tc>
+                  <a:txBody>
+                    <a:bodyPr/>
+                    <a:lstStyle/>
+                    <a:p>
+                      <a:r>
+                        <a:rPr lang="en-US" smtClean="0"/>
+                        <a:t>0.93</a:t>
+                      </a:r>
+                      <a:endParaRPr lang="en-US" dirty="0"/>
+                    </a:p>
+                  </a:txBody>
+                  <a:tcPr/>
+                </a:tc>
+                <a:tc>
+                  <a:txBody>
+                    <a:bodyPr/>
+                    <a:lstStyle/>
+                    <a:p>
+                      <a:r>
+                        <a:rPr lang="en-US" dirty="0" smtClean="0"/>
+                        <a:t>Ham</a:t>
+                      </a:r>
+                      <a:endParaRPr lang="en-US" dirty="0"/>
+                    </a:p>
+                  </a:txBody>
+                  <a:tcPr/>
+                </a:tc>
+              </a:tr>
+            </a:tbl>
+          </a:graphicData>
+        </a:graphic>
+      </p:graphicFrame>
+    </p:spTree>
+    <p:extLst>
+      <p:ext uri="{BB962C8B-B14F-4D97-AF65-F5344CB8AC3E}">
+        <p14:creationId xmlns:p14="http://schemas.microsoft.com/office/powerpoint/2010/main" val="3655667848"/>
+      </p:ext>
+    </p:extLst>
+  </p:cSld>
+  <p:clrMapOvr>
+    <a:masterClrMapping/>
+  </p:clrMapOvr>
+  <p:transition/>
+  <p:timing>
+    <p:tnLst>
+      <p:par>
+        <p:cTn id="1" dur="indefinite" restart="never" nodeType="tmRoot">
+          <p:childTnLst>
+            <p:seq concurrent="1" nextAc="seek">
+              <p:cTn id="2" dur="indefinite" nodeType="mainSeq">
+                <p:childTnLst>
+                  <p:par>
+                    <p:cTn id="3" fill="hold">
+                      <p:stCondLst>
+                        <p:cond delay="indefinite"/>
+                      </p:stCondLst>
+                      <p:childTnLst>
+                        <p:par>
+                          <p:cTn id="4" fill="hold">
+                            <p:stCondLst>
+                              <p:cond delay="0"/>
+                            </p:stCondLst>
+                            <p:childTnLst>
+                              <p:par>
+                                <p:cTn id="5" presetID="1" presetClass="entr" presetSubtype="0" fill="hold" nodeType="clickEffect">
+                                  <p:stCondLst>
+                                    <p:cond delay="0"/>
+                                  </p:stCondLst>
+                                  <p:childTnLst>
+                                    <p:set>
+                                      <p:cBhvr>
+                                        <p:cTn id="6" dur="1" fill="hold">
+                                          <p:stCondLst>
+                                            <p:cond delay="0"/>
+                                          </p:stCondLst>
+                                        </p:cTn>
+                                        <p:tgtEl>
+                                          <p:spTgt spid="5">
+                                            <p:txEl>
+                                              <p:pRg st="2" end="2"/>
+                                            </p:txEl>
+                                          </p:spTgt>
+                                        </p:tgtEl>
+                                        <p:attrNameLst>
+                                          <p:attrName>style.visibility</p:attrName>
+                                        </p:attrNameLst>
+                                      </p:cBhvr>
+                                      <p:to>
+                                        <p:strVal val="visible"/>
+                                      </p:to>
+                                    </p:set>
+                                  </p:childTnLst>
+                                </p:cTn>
+                              </p:par>
+                            </p:childTnLst>
+                          </p:cTn>
+                        </p:par>
+                      </p:childTnLst>
+                    </p:cTn>
+                  </p:par>
+                </p:childTnLst>
+              </p:cTn>
+              <p:prevCondLst>
+                <p:cond evt="onPrev" delay="0">
+                  <p:tgtEl>
+                    <p:sldTgt/>
+                  </p:tgtEl>
+                </p:cond>
+              </p:prevCondLst>
+              <p:nextCondLst>
+                <p:cond evt="onNext" delay="0">
+                  <p:tgtEl>
+                    <p:sldTgt/>
+                  </p:tgtEl>
+                </p:cond>
+              </p:nextCondLst>
+            </p:seq>
+          </p:childTnLst>
+        </p:cTn>
+      </p:par>
+    </p:tnLst>
+  </p:timing>
+</p:sld>
+</file>
+
+<file path=ppt/slides/slide13.xml><?xml version="1.0" encoding="utf-8"?>
+<p:sld xmlns:a="http://schemas.openxmlformats.org/drawingml/2006/main" xmlns:r="http://schemas.openxmlformats.org/officeDocument/2006/relationships" xmlns:p="http://schemas.openxmlformats.org/presentationml/2006/main">
+  <p:cSld>
+    <p:spTree>
+      <p:nvGrpSpPr>
+        <p:cNvPr id="1" name=""/>
+        <p:cNvGrpSpPr/>
+        <p:nvPr/>
+      </p:nvGrpSpPr>
+      <p:grpSpPr>
+        <a:xfrm>
+          <a:off x="0" y="0"/>
+          <a:ext cx="0" cy="0"/>
+          <a:chOff x="0" y="0"/>
+          <a:chExt cx="0" cy="0"/>
+        </a:xfrm>
+      </p:grpSpPr>
+      <p:sp>
+        <p:nvSpPr>
           <p:cNvPr id="4" name="Content Placeholder 3"/>
           <p:cNvSpPr>
             <a:spLocks noGrp="1"/>
@@ -9295,7 +12572,7 @@
       </p:sp>
       <p:pic>
         <p:nvPicPr>
-          <p:cNvPr id="1026" name="Picture 2" descr="http://www.dataschool.io/content/images/2014/Mar/confusion_matrix_simple.PNG"/>
+          <p:cNvPr id="1026" name="Picture 2"/>
           <p:cNvPicPr>
             <a:picLocks noChangeAspect="1" noChangeArrowheads="1"/>
           </p:cNvPicPr>
@@ -9309,15 +12586,14 @@
               </a:ext>
             </a:extLst>
           </a:blip>
-          <a:srcRect/>
           <a:stretch>
             <a:fillRect/>
           </a:stretch>
         </p:blipFill>
         <p:spPr bwMode="auto">
           <a:xfrm>
-            <a:off x="566737" y="1638300"/>
-            <a:ext cx="3752850" cy="2028826"/>
+            <a:off x="642937" y="1661027"/>
+            <a:ext cx="3677163" cy="1943371"/>
           </a:xfrm>
           <a:prstGeom prst="rect">
             <a:avLst/>
@@ -9388,8 +12664,17 @@
               <a:rPr lang="en-US" sz="2500" smtClean="0">
                 <a:latin typeface="PFDinTextCompPro-Italic" panose="02000506020000020004" pitchFamily="2" charset="0"/>
               </a:rPr>
-              <a:t>How many predictions of disease?</a:t>
-            </a:r>
+              <a:t>How many </a:t>
+            </a:r>
+            <a:r>
+              <a:rPr lang="en-US" sz="2500" smtClean="0">
+                <a:latin typeface="PFDinTextCompPro-Italic" panose="02000506020000020004" pitchFamily="2" charset="0"/>
+              </a:rPr>
+              <a:t>times is disease predicted?</a:t>
+            </a:r>
+            <a:endParaRPr lang="en-US" sz="2500" smtClean="0">
+              <a:latin typeface="PFDinTextCompPro-Italic" panose="02000506020000020004" pitchFamily="2" charset="0"/>
+            </a:endParaRPr>
           </a:p>
           <a:p>
             <a:pPr marL="342900" indent="-342900" algn="l">
@@ -9441,20 +12726,35 @@
           <a:p>
             <a:pPr algn="l"/>
             <a:r>
+              <a:rPr lang="en-US" sz="2500">
+                <a:latin typeface="PFDinTextCompPro-Italic" panose="02000506020000020004" pitchFamily="2" charset="0"/>
+              </a:rPr>
+              <a:t>NO = negative test = False = 0</a:t>
+            </a:r>
+          </a:p>
+          <a:p>
+            <a:pPr algn="l"/>
+            <a:r>
               <a:rPr lang="en-US" sz="2500" smtClean="0">
                 <a:latin typeface="PFDinTextCompPro-Italic" panose="02000506020000020004" pitchFamily="2" charset="0"/>
               </a:rPr>
-              <a:t>YES = positive test = True = 1</a:t>
-            </a:r>
-          </a:p>
-          <a:p>
-            <a:pPr algn="l"/>
+              <a:t>YES </a:t>
+            </a:r>
             <a:r>
               <a:rPr lang="en-US" sz="2500" smtClean="0">
                 <a:latin typeface="PFDinTextCompPro-Italic" panose="02000506020000020004" pitchFamily="2" charset="0"/>
               </a:rPr>
-              <a:t>NO = negative test = False = 0</a:t>
-            </a:r>
+              <a:t>= positive test = True = </a:t>
+            </a:r>
+            <a:r>
+              <a:rPr lang="en-US" sz="2500" smtClean="0">
+                <a:latin typeface="PFDinTextCompPro-Italic" panose="02000506020000020004" pitchFamily="2" charset="0"/>
+              </a:rPr>
+              <a:t>1</a:t>
+            </a:r>
+            <a:endParaRPr lang="en-US" sz="2500" smtClean="0">
+              <a:latin typeface="PFDinTextCompPro-Italic" panose="02000506020000020004" pitchFamily="2" charset="0"/>
+            </a:endParaRPr>
           </a:p>
         </p:txBody>
       </p:sp>
@@ -9786,7 +13086,7 @@
         </p:nvSpPr>
         <p:spPr>
           <a:xfrm>
-            <a:off x="4910137" y="1333500"/>
+            <a:off x="4910137" y="1104900"/>
             <a:ext cx="3657600" cy="2015936"/>
           </a:xfrm>
           <a:prstGeom prst="rect">
@@ -9863,7 +13163,7 @@
       </p:sp>
       <p:pic>
         <p:nvPicPr>
-          <p:cNvPr id="2050" name="Picture 2" descr="http://www.dataschool.io/content/images/2014/Mar/confusion_matrix.PNG"/>
+          <p:cNvPr id="2050" name="Picture 2"/>
           <p:cNvPicPr>
             <a:picLocks noChangeAspect="1" noChangeArrowheads="1"/>
           </p:cNvPicPr>
@@ -9877,15 +13177,14 @@
               </a:ext>
             </a:extLst>
           </a:blip>
-          <a:srcRect/>
           <a:stretch>
             <a:fillRect/>
           </a:stretch>
         </p:blipFill>
         <p:spPr bwMode="auto">
           <a:xfrm>
-            <a:off x="338137" y="1211580"/>
-            <a:ext cx="4366506" cy="2514600"/>
+            <a:off x="338137" y="1039708"/>
+            <a:ext cx="4407357" cy="2515904"/>
           </a:xfrm>
           <a:prstGeom prst="rect">
             <a:avLst/>
@@ -9910,7 +13209,7 @@
         </p:nvSpPr>
         <p:spPr>
           <a:xfrm>
-            <a:off x="490537" y="3626584"/>
+            <a:off x="490537" y="3467100"/>
             <a:ext cx="3886200" cy="1246495"/>
           </a:xfrm>
           <a:prstGeom prst="rect">
@@ -9941,7 +13240,19 @@
               <a:rPr lang="en-US" sz="2500" smtClean="0">
                 <a:latin typeface="PFDinTextCompPro-Italic" panose="02000506020000020004" pitchFamily="2" charset="0"/>
               </a:rPr>
-              <a:t>Overall, how often is it correct?</a:t>
+              <a:t>Overall, how often is it </a:t>
+            </a:r>
+            <a:r>
+              <a:rPr lang="en-US" sz="2500" b="1" smtClean="0">
+                <a:latin typeface="PFDinTextCompPro-Italic" panose="02000506020000020004" pitchFamily="2" charset="0"/>
+              </a:rPr>
+              <a:t>correct</a:t>
+            </a:r>
+            <a:r>
+              <a:rPr lang="en-US" sz="2500" smtClean="0">
+                <a:latin typeface="PFDinTextCompPro-Italic" panose="02000506020000020004" pitchFamily="2" charset="0"/>
+              </a:rPr>
+              <a:t>?</a:t>
             </a:r>
           </a:p>
           <a:p>
@@ -9966,7 +13277,7 @@
         </p:nvSpPr>
         <p:spPr>
           <a:xfrm>
-            <a:off x="4529137" y="3611344"/>
+            <a:off x="4529137" y="3467100"/>
             <a:ext cx="3886200" cy="1246495"/>
           </a:xfrm>
           <a:prstGeom prst="rect">
@@ -9997,7 +13308,19 @@
               <a:rPr lang="en-US" sz="2500" smtClean="0">
                 <a:latin typeface="PFDinTextCompPro-Italic" panose="02000506020000020004" pitchFamily="2" charset="0"/>
               </a:rPr>
-              <a:t>Overall, how often is it wrong?</a:t>
+              <a:t>Overall, how often is it </a:t>
+            </a:r>
+            <a:r>
+              <a:rPr lang="en-US" sz="2500" b="1" smtClean="0">
+                <a:latin typeface="PFDinTextCompPro-Italic" panose="02000506020000020004" pitchFamily="2" charset="0"/>
+              </a:rPr>
+              <a:t>wrong</a:t>
+            </a:r>
+            <a:r>
+              <a:rPr lang="en-US" sz="2500" smtClean="0">
+                <a:latin typeface="PFDinTextCompPro-Italic" panose="02000506020000020004" pitchFamily="2" charset="0"/>
+              </a:rPr>
+              <a:t>?</a:t>
             </a:r>
           </a:p>
           <a:p>
@@ -10009,7 +13332,13 @@
               <a:rPr lang="en-US" sz="2500" smtClean="0">
                 <a:latin typeface="PFDinTextCompPro-Italic" panose="02000506020000020004" pitchFamily="2" charset="0"/>
               </a:rPr>
-              <a:t>1 - accuracy = 1 - 0.91 = 0.09</a:t>
+              <a:t>(FP + FN) / total = 15/165 </a:t>
+            </a:r>
+            <a:r>
+              <a:rPr lang="en-US" sz="2500" smtClean="0">
+                <a:latin typeface="PFDinTextCompPro-Italic" panose="02000506020000020004" pitchFamily="2" charset="0"/>
+              </a:rPr>
+              <a:t>= 0.09</a:t>
             </a:r>
           </a:p>
         </p:txBody>
@@ -10272,15 +13601,33 @@
                                   </p:childTnLst>
                                 </p:cTn>
                               </p:par>
+                            </p:childTnLst>
+                          </p:cTn>
+                        </p:par>
+                      </p:childTnLst>
+                    </p:cTn>
+                  </p:par>
+                  <p:par>
+                    <p:cTn id="23" fill="hold">
+                      <p:stCondLst>
+                        <p:cond delay="indefinite"/>
+                      </p:stCondLst>
+                      <p:childTnLst>
+                        <p:par>
+                          <p:cTn id="24" fill="hold">
+                            <p:stCondLst>
+                              <p:cond delay="0"/>
+                            </p:stCondLst>
+                            <p:childTnLst>
                               <p:par>
-                                <p:cTn id="23" presetID="1" presetClass="entr" presetSubtype="0" fill="hold" nodeType="withEffect">
+                                <p:cTn id="25" presetID="1" presetClass="entr" presetSubtype="0" fill="hold" nodeType="clickEffect">
                                   <p:stCondLst>
                                     <p:cond delay="0"/>
                                   </p:stCondLst>
                                   <p:childTnLst>
                                     <p:set>
                                       <p:cBhvr>
-                                        <p:cTn id="24" dur="1" fill="hold">
+                                        <p:cTn id="26" dur="1" fill="hold">
                                           <p:stCondLst>
                                             <p:cond delay="0"/>
                                           </p:stCondLst>
@@ -10304,14 +13651,14 @@
                                 </p:cTn>
                               </p:par>
                               <p:par>
-                                <p:cTn id="25" presetID="1" presetClass="entr" presetSubtype="0" fill="hold" nodeType="withEffect">
+                                <p:cTn id="27" presetID="1" presetClass="entr" presetSubtype="0" fill="hold" nodeType="withEffect">
                                   <p:stCondLst>
                                     <p:cond delay="0"/>
                                   </p:stCondLst>
                                   <p:childTnLst>
                                     <p:set>
                                       <p:cBhvr>
-                                        <p:cTn id="26" dur="1" fill="hold">
+                                        <p:cTn id="28" dur="1" fill="hold">
                                           <p:stCondLst>
                                             <p:cond delay="0"/>
                                           </p:stCondLst>
@@ -10341,26 +13688,26 @@
                     </p:cTn>
                   </p:par>
                   <p:par>
-                    <p:cTn id="27" fill="hold">
+                    <p:cTn id="29" fill="hold">
                       <p:stCondLst>
                         <p:cond delay="indefinite"/>
                       </p:stCondLst>
                       <p:childTnLst>
                         <p:par>
-                          <p:cTn id="28" fill="hold">
+                          <p:cTn id="30" fill="hold">
                             <p:stCondLst>
                               <p:cond delay="0"/>
                             </p:stCondLst>
                             <p:childTnLst>
                               <p:par>
-                                <p:cTn id="29" presetID="1" presetClass="entr" presetSubtype="0" fill="hold" nodeType="clickEffect">
+                                <p:cTn id="31" presetID="1" presetClass="entr" presetSubtype="0" fill="hold" nodeType="clickEffect">
                                   <p:stCondLst>
                                     <p:cond delay="0"/>
                                   </p:stCondLst>
                                   <p:childTnLst>
                                     <p:set>
                                       <p:cBhvr>
-                                        <p:cTn id="30" dur="1" fill="hold">
+                                        <p:cTn id="32" dur="1" fill="hold">
                                           <p:stCondLst>
                                             <p:cond delay="0"/>
                                           </p:stCondLst>
@@ -10383,15 +13730,33 @@
                                   </p:childTnLst>
                                 </p:cTn>
                               </p:par>
+                            </p:childTnLst>
+                          </p:cTn>
+                        </p:par>
+                      </p:childTnLst>
+                    </p:cTn>
+                  </p:par>
+                  <p:par>
+                    <p:cTn id="33" fill="hold">
+                      <p:stCondLst>
+                        <p:cond delay="indefinite"/>
+                      </p:stCondLst>
+                      <p:childTnLst>
+                        <p:par>
+                          <p:cTn id="34" fill="hold">
+                            <p:stCondLst>
+                              <p:cond delay="0"/>
+                            </p:stCondLst>
+                            <p:childTnLst>
                               <p:par>
-                                <p:cTn id="31" presetID="1" presetClass="entr" presetSubtype="0" fill="hold" nodeType="withEffect">
+                                <p:cTn id="35" presetID="1" presetClass="entr" presetSubtype="0" fill="hold" nodeType="clickEffect">
                                   <p:stCondLst>
                                     <p:cond delay="0"/>
                                   </p:stCondLst>
                                   <p:childTnLst>
                                     <p:set>
                                       <p:cBhvr>
-                                        <p:cTn id="32" dur="1" fill="hold">
+                                        <p:cTn id="36" dur="1" fill="hold">
                                           <p:stCondLst>
                                             <p:cond delay="0"/>
                                           </p:stCondLst>
@@ -10415,14 +13780,14 @@
                                 </p:cTn>
                               </p:par>
                               <p:par>
-                                <p:cTn id="33" presetID="1" presetClass="entr" presetSubtype="0" fill="hold" nodeType="withEffect">
+                                <p:cTn id="37" presetID="1" presetClass="entr" presetSubtype="0" fill="hold" nodeType="withEffect">
                                   <p:stCondLst>
                                     <p:cond delay="0"/>
                                   </p:stCondLst>
                                   <p:childTnLst>
                                     <p:set>
                                       <p:cBhvr>
-                                        <p:cTn id="34" dur="1" fill="hold">
+                                        <p:cTn id="38" dur="1" fill="hold">
                                           <p:stCondLst>
                                             <p:cond delay="0"/>
                                           </p:stCondLst>
@@ -10564,8 +13929,8 @@
         </p:nvSpPr>
         <p:spPr>
           <a:xfrm>
-            <a:off x="4910137" y="1333500"/>
-            <a:ext cx="3733800" cy="1246495"/>
+            <a:off x="4910137" y="1070164"/>
+            <a:ext cx="3733800" cy="2015936"/>
           </a:xfrm>
           <a:prstGeom prst="rect">
             <a:avLst/>
@@ -10583,8 +13948,11 @@
               <a:rPr lang="en-US" sz="2500" smtClean="0">
                 <a:latin typeface="PFDinTextCompPro-Italic" panose="02000506020000020004" pitchFamily="2" charset="0"/>
               </a:rPr>
-              <a:t>True Positive Rate:</a:t>
-            </a:r>
+              <a:t>Sensitivity:</a:t>
+            </a:r>
+            <a:endParaRPr lang="en-US" sz="2500" smtClean="0">
+              <a:latin typeface="PFDinTextCompPro-Italic" panose="02000506020000020004" pitchFamily="2" charset="0"/>
+            </a:endParaRPr>
           </a:p>
           <a:p>
             <a:pPr marL="342900" indent="-342900" algn="l">
@@ -10595,7 +13963,31 @@
               <a:rPr lang="en-US" sz="2500" smtClean="0">
                 <a:latin typeface="PFDinTextCompPro-Italic" panose="02000506020000020004" pitchFamily="2" charset="0"/>
               </a:rPr>
-              <a:t>TP / actual yes = 100/105 = 0.95</a:t>
+              <a:t>When actual value is </a:t>
+            </a:r>
+            <a:r>
+              <a:rPr lang="en-US" sz="2500" b="1" smtClean="0">
+                <a:latin typeface="PFDinTextCompPro-Italic" panose="02000506020000020004" pitchFamily="2" charset="0"/>
+              </a:rPr>
+              <a:t>positive</a:t>
+            </a:r>
+            <a:r>
+              <a:rPr lang="en-US" sz="2500" smtClean="0">
+                <a:latin typeface="PFDinTextCompPro-Italic" panose="02000506020000020004" pitchFamily="2" charset="0"/>
+              </a:rPr>
+              <a:t>, how often is prediction </a:t>
+            </a:r>
+            <a:r>
+              <a:rPr lang="en-US" sz="2500" b="1" smtClean="0">
+                <a:latin typeface="PFDinTextCompPro-Italic" panose="02000506020000020004" pitchFamily="2" charset="0"/>
+              </a:rPr>
+              <a:t>correct</a:t>
+            </a:r>
+            <a:r>
+              <a:rPr lang="en-US" sz="2500" smtClean="0">
+                <a:latin typeface="PFDinTextCompPro-Italic" panose="02000506020000020004" pitchFamily="2" charset="0"/>
+              </a:rPr>
+              <a:t>?</a:t>
             </a:r>
           </a:p>
           <a:p>
@@ -10607,14 +13999,50 @@
               <a:rPr lang="en-US" sz="2500" smtClean="0">
                 <a:latin typeface="PFDinTextCompPro-Italic" panose="02000506020000020004" pitchFamily="2" charset="0"/>
               </a:rPr>
-              <a:t>“sensitivity” or “recall”</a:t>
+              <a:t>TP </a:t>
+            </a:r>
+            <a:r>
+              <a:rPr lang="en-US" sz="2500" smtClean="0">
+                <a:latin typeface="PFDinTextCompPro-Italic" panose="02000506020000020004" pitchFamily="2" charset="0"/>
+              </a:rPr>
+              <a:t>/ actual yes = 100/105 = 0.95</a:t>
+            </a:r>
+          </a:p>
+          <a:p>
+            <a:pPr marL="342900" indent="-342900" algn="l">
+              <a:buFont typeface="Arial" panose="020B0604020202020204" pitchFamily="34" charset="0"/>
+              <a:buChar char="•"/>
+            </a:pPr>
+            <a:r>
+              <a:rPr lang="en-US" sz="2500" smtClean="0">
+                <a:latin typeface="PFDinTextCompPro-Italic" panose="02000506020000020004" pitchFamily="2" charset="0"/>
+              </a:rPr>
+              <a:t>“True Positive Rate” </a:t>
+            </a:r>
+            <a:r>
+              <a:rPr lang="en-US" sz="2500" smtClean="0">
+                <a:latin typeface="PFDinTextCompPro-Italic" panose="02000506020000020004" pitchFamily="2" charset="0"/>
+              </a:rPr>
+              <a:t>or </a:t>
+            </a:r>
+            <a:r>
+              <a:rPr lang="en-US" sz="2500" smtClean="0">
+                <a:latin typeface="PFDinTextCompPro-Italic" panose="02000506020000020004" pitchFamily="2" charset="0"/>
+              </a:rPr>
+              <a:t>“Recall</a:t>
+            </a:r>
+            <a:r>
+              <a:rPr lang="en-US" sz="2500" smtClean="0">
+                <a:latin typeface="PFDinTextCompPro-Italic" panose="02000506020000020004" pitchFamily="2" charset="0"/>
+              </a:rPr>
+              <a:t>”</a:t>
             </a:r>
           </a:p>
         </p:txBody>
       </p:sp>
       <p:pic>
         <p:nvPicPr>
-          <p:cNvPr id="2050" name="Picture 2" descr="http://www.dataschool.io/content/images/2014/Mar/confusion_matrix.PNG"/>
+          <p:cNvPr id="2050" name="Picture 2"/>
           <p:cNvPicPr>
             <a:picLocks noChangeAspect="1" noChangeArrowheads="1"/>
           </p:cNvPicPr>
@@ -10628,15 +14056,14 @@
               </a:ext>
             </a:extLst>
           </a:blip>
-          <a:srcRect/>
           <a:stretch>
             <a:fillRect/>
           </a:stretch>
         </p:blipFill>
         <p:spPr bwMode="auto">
           <a:xfrm>
-            <a:off x="338137" y="1211580"/>
-            <a:ext cx="4366506" cy="2514600"/>
+            <a:off x="338137" y="1039708"/>
+            <a:ext cx="4407357" cy="2515904"/>
           </a:xfrm>
           <a:prstGeom prst="rect">
             <a:avLst/>
@@ -10661,8 +14088,8 @@
         </p:nvSpPr>
         <p:spPr>
           <a:xfrm>
-            <a:off x="490537" y="3726180"/>
-            <a:ext cx="4038600" cy="861774"/>
+            <a:off x="490537" y="3390900"/>
+            <a:ext cx="3657600" cy="1631216"/>
           </a:xfrm>
           <a:prstGeom prst="rect">
             <a:avLst/>
@@ -10677,10 +14104,10 @@
           <a:p>
             <a:pPr algn="l"/>
             <a:r>
-              <a:rPr lang="en-US" sz="2500" smtClean="0">
+              <a:rPr lang="en-US" sz="2500">
                 <a:latin typeface="PFDinTextCompPro-Italic" panose="02000506020000020004" pitchFamily="2" charset="0"/>
               </a:rPr>
-              <a:t>Precision:</a:t>
+              <a:t>False Positive Rate:</a:t>
             </a:r>
           </a:p>
           <a:p>
@@ -10692,8 +14119,53 @@
               <a:rPr lang="en-US" sz="2500" smtClean="0">
                 <a:latin typeface="PFDinTextCompPro-Italic" panose="02000506020000020004" pitchFamily="2" charset="0"/>
               </a:rPr>
-              <a:t>TP / predicted yes = 100/110 = 0.91</a:t>
-            </a:r>
+              <a:t>When actual value is </a:t>
+            </a:r>
+            <a:r>
+              <a:rPr lang="en-US" sz="2500" b="1" smtClean="0">
+                <a:latin typeface="PFDinTextCompPro-Italic" panose="02000506020000020004" pitchFamily="2" charset="0"/>
+              </a:rPr>
+              <a:t>negative</a:t>
+            </a:r>
+            <a:r>
+              <a:rPr lang="en-US" sz="2500" smtClean="0">
+                <a:latin typeface="PFDinTextCompPro-Italic" panose="02000506020000020004" pitchFamily="2" charset="0"/>
+              </a:rPr>
+              <a:t>, how often is prediction </a:t>
+            </a:r>
+            <a:r>
+              <a:rPr lang="en-US" sz="2500" b="1" smtClean="0">
+                <a:latin typeface="PFDinTextCompPro-Italic" panose="02000506020000020004" pitchFamily="2" charset="0"/>
+              </a:rPr>
+              <a:t>wrong</a:t>
+            </a:r>
+            <a:r>
+              <a:rPr lang="en-US" sz="2500" smtClean="0">
+                <a:latin typeface="PFDinTextCompPro-Italic" panose="02000506020000020004" pitchFamily="2" charset="0"/>
+              </a:rPr>
+              <a:t>?</a:t>
+            </a:r>
+          </a:p>
+          <a:p>
+            <a:pPr marL="342900" indent="-342900" algn="l">
+              <a:buFont typeface="Arial" panose="020B0604020202020204" pitchFamily="34" charset="0"/>
+              <a:buChar char="•"/>
+            </a:pPr>
+            <a:r>
+              <a:rPr lang="en-US" sz="2500" smtClean="0">
+                <a:latin typeface="PFDinTextCompPro-Italic" panose="02000506020000020004" pitchFamily="2" charset="0"/>
+              </a:rPr>
+              <a:t>FP </a:t>
+            </a:r>
+            <a:r>
+              <a:rPr lang="en-US" sz="2500">
+                <a:latin typeface="PFDinTextCompPro-Italic" panose="02000506020000020004" pitchFamily="2" charset="0"/>
+              </a:rPr>
+              <a:t>/ actual no = 10/60 = 0.17</a:t>
+            </a:r>
+            <a:endParaRPr lang="en-US" sz="2500" smtClean="0">
+              <a:latin typeface="PFDinTextCompPro-Italic" panose="02000506020000020004" pitchFamily="2" charset="0"/>
+            </a:endParaRPr>
           </a:p>
         </p:txBody>
       </p:sp>
@@ -10705,8 +14177,8 @@
         </p:nvSpPr>
         <p:spPr>
           <a:xfrm>
-            <a:off x="4910137" y="3726180"/>
-            <a:ext cx="3886200" cy="861774"/>
+            <a:off x="4910137" y="3359884"/>
+            <a:ext cx="3886200" cy="1631216"/>
           </a:xfrm>
           <a:prstGeom prst="rect">
             <a:avLst/>
@@ -10736,39 +14208,31 @@
               <a:rPr lang="en-US" sz="2500" smtClean="0">
                 <a:latin typeface="PFDinTextCompPro-Italic" panose="02000506020000020004" pitchFamily="2" charset="0"/>
               </a:rPr>
-              <a:t>1 - FPR = 1 - 0.17 = 0.83</a:t>
-            </a:r>
-          </a:p>
-        </p:txBody>
-      </p:sp>
-      <p:sp>
-        <p:nvSpPr>
-          <p:cNvPr id="9" name="TextBox 8"/>
-          <p:cNvSpPr txBox="1"/>
-          <p:nvPr/>
-        </p:nvSpPr>
-        <p:spPr>
-          <a:xfrm>
-            <a:off x="4910137" y="2705100"/>
-            <a:ext cx="3733800" cy="861774"/>
-          </a:xfrm>
-          <a:prstGeom prst="rect">
-            <a:avLst/>
-          </a:prstGeom>
-          <a:noFill/>
-        </p:spPr>
-        <p:txBody>
-          <a:bodyPr wrap="square" rtlCol="0">
-            <a:spAutoFit/>
-          </a:bodyPr>
-          <a:lstStyle/>
-          <a:p>
-            <a:pPr algn="l"/>
+              <a:t>When actual value is </a:t>
+            </a:r>
+            <a:r>
+              <a:rPr lang="en-US" sz="2500" b="1" smtClean="0">
+                <a:latin typeface="PFDinTextCompPro-Italic" panose="02000506020000020004" pitchFamily="2" charset="0"/>
+              </a:rPr>
+              <a:t>negative</a:t>
+            </a:r>
             <a:r>
               <a:rPr lang="en-US" sz="2500" smtClean="0">
                 <a:latin typeface="PFDinTextCompPro-Italic" panose="02000506020000020004" pitchFamily="2" charset="0"/>
               </a:rPr>
-              <a:t>False Positive Rate:</a:t>
+              <a:t>, how often is prediction </a:t>
+            </a:r>
+            <a:r>
+              <a:rPr lang="en-US" sz="2500" b="1" smtClean="0">
+                <a:latin typeface="PFDinTextCompPro-Italic" panose="02000506020000020004" pitchFamily="2" charset="0"/>
+              </a:rPr>
+              <a:t>correct</a:t>
+            </a:r>
+            <a:r>
+              <a:rPr lang="en-US" sz="2500" smtClean="0">
+                <a:latin typeface="PFDinTextCompPro-Italic" panose="02000506020000020004" pitchFamily="2" charset="0"/>
+              </a:rPr>
+              <a:t>?</a:t>
             </a:r>
           </a:p>
           <a:p>
@@ -10777,16 +14241,16 @@
               <a:buChar char="•"/>
             </a:pPr>
             <a:r>
-              <a:rPr lang="en-US" sz="2500">
-                <a:latin typeface="PFDinTextCompPro-Italic" panose="02000506020000020004" pitchFamily="2" charset="0"/>
-              </a:rPr>
-              <a:t>F</a:t>
-            </a:r>
-            <a:r>
               <a:rPr lang="en-US" sz="2500" smtClean="0">
                 <a:latin typeface="PFDinTextCompPro-Italic" panose="02000506020000020004" pitchFamily="2" charset="0"/>
               </a:rPr>
-              <a:t>P / actual no = 10/60 = 0.17</a:t>
+              <a:t>TN / actual no = 50/60 </a:t>
+            </a:r>
+            <a:r>
+              <a:rPr lang="en-US" sz="2500" smtClean="0">
+                <a:latin typeface="PFDinTextCompPro-Italic" panose="02000506020000020004" pitchFamily="2" charset="0"/>
+              </a:rPr>
+              <a:t>= 0.83</a:t>
             </a:r>
           </a:p>
         </p:txBody>
@@ -10836,9 +14300,9 @@
                                           </p:stCondLst>
                                         </p:cTn>
                                         <p:tgtEl>
-                                          <p:spTgt spid="9">
+                                          <p:spTgt spid="2">
                                             <p:txEl>
-                                              <p:pRg st="0" end="0"/>
+                                              <p:pRg st="1" end="1"/>
                                             </p:txEl>
                                           </p:spTgt>
                                         </p:tgtEl>
@@ -10867,9 +14331,40 @@
                                           </p:stCondLst>
                                         </p:cTn>
                                         <p:tgtEl>
-                                          <p:spTgt spid="9">
+                                          <p:spTgt spid="2">
                                             <p:txEl>
-                                              <p:pRg st="1" end="1"/>
+                                              <p:pRg st="2" end="2"/>
+                                            </p:txEl>
+                                          </p:spTgt>
+                                        </p:tgtEl>
+                                        <p:attrNameLst>
+                                          <p:attrName>style.visibility</p:attrName>
+                                        </p:attrNameLst>
+                                      </p:cBhvr>
+                                      <p:to>
+                                        <p:strVal val="visible"/>
+                                      </p:to>
+                                    </p:set>
+                                  </p:childTnLst>
+                                </p:cTn>
+                              </p:par>
+                              <p:par>
+                                <p:cTn id="9" presetID="1" presetClass="entr" presetSubtype="0" fill="hold" nodeType="withEffect">
+                                  <p:stCondLst>
+                                    <p:cond delay="0"/>
+                                  </p:stCondLst>
+                                  <p:childTnLst>
+                                    <p:set>
+                                      <p:cBhvr>
+                                        <p:cTn id="10" dur="1" fill="hold">
+                                          <p:stCondLst>
+                                            <p:cond delay="0"/>
+                                          </p:stCondLst>
+                                        </p:cTn>
+                                        <p:tgtEl>
+                                          <p:spTgt spid="2">
+                                            <p:txEl>
+                                              <p:pRg st="3" end="3"/>
                                             </p:txEl>
                                           </p:spTgt>
                                         </p:tgtEl>
@@ -10891,50 +14386,19 @@
                     </p:cTn>
                   </p:par>
                   <p:par>
-                    <p:cTn id="9" fill="hold">
+                    <p:cTn id="11" fill="hold">
                       <p:stCondLst>
                         <p:cond delay="indefinite"/>
                       </p:stCondLst>
                       <p:childTnLst>
                         <p:par>
-                          <p:cTn id="10" fill="hold">
+                          <p:cTn id="12" fill="hold">
                             <p:stCondLst>
                               <p:cond delay="0"/>
                             </p:stCondLst>
                             <p:childTnLst>
                               <p:par>
-                                <p:cTn id="11" presetID="1" presetClass="entr" presetSubtype="0" fill="hold" nodeType="clickEffect">
-                                  <p:stCondLst>
-                                    <p:cond delay="0"/>
-                                  </p:stCondLst>
-                                  <p:childTnLst>
-                                    <p:set>
-                                      <p:cBhvr>
-                                        <p:cTn id="12" dur="1" fill="hold">
-                                          <p:stCondLst>
-                                            <p:cond delay="0"/>
-                                          </p:stCondLst>
-                                        </p:cTn>
-                                        <p:tgtEl>
-                                          <p:spTgt spid="11">
-                                            <p:txEl>
-                                              <p:pRg st="0" end="0"/>
-                                            </p:txEl>
-                                          </p:spTgt>
-                                        </p:tgtEl>
-                                        <p:attrNameLst>
-                                          <p:attrName>style.visibility</p:attrName>
-                                        </p:attrNameLst>
-                                      </p:cBhvr>
-                                      <p:to>
-                                        <p:strVal val="visible"/>
-                                      </p:to>
-                                    </p:set>
-                                  </p:childTnLst>
-                                </p:cTn>
-                              </p:par>
-                              <p:par>
-                                <p:cTn id="13" presetID="1" presetClass="entr" presetSubtype="0" fill="hold" nodeType="withEffect">
+                                <p:cTn id="13" presetID="1" presetClass="entr" presetSubtype="0" fill="hold" nodeType="clickEffect">
                                   <p:stCondLst>
                                     <p:cond delay="0"/>
                                   </p:stCondLst>
@@ -10949,7 +14413,7 @@
                                         <p:tgtEl>
                                           <p:spTgt spid="11">
                                             <p:txEl>
-                                              <p:pRg st="1" end="1"/>
+                                              <p:pRg st="0" end="0"/>
                                             </p:txEl>
                                           </p:spTgt>
                                         </p:tgtEl>
@@ -10996,9 +14460,9 @@
                                           </p:stCondLst>
                                         </p:cTn>
                                         <p:tgtEl>
-                                          <p:spTgt spid="10">
+                                          <p:spTgt spid="11">
                                             <p:txEl>
-                                              <p:pRg st="0" end="0"/>
+                                              <p:pRg st="1" end="1"/>
                                             </p:txEl>
                                           </p:spTgt>
                                         </p:tgtEl>
@@ -11027,9 +14491,138 @@
                                           </p:stCondLst>
                                         </p:cTn>
                                         <p:tgtEl>
+                                          <p:spTgt spid="11">
+                                            <p:txEl>
+                                              <p:pRg st="2" end="2"/>
+                                            </p:txEl>
+                                          </p:spTgt>
+                                        </p:tgtEl>
+                                        <p:attrNameLst>
+                                          <p:attrName>style.visibility</p:attrName>
+                                        </p:attrNameLst>
+                                      </p:cBhvr>
+                                      <p:to>
+                                        <p:strVal val="visible"/>
+                                      </p:to>
+                                    </p:set>
+                                  </p:childTnLst>
+                                </p:cTn>
+                              </p:par>
+                            </p:childTnLst>
+                          </p:cTn>
+                        </p:par>
+                      </p:childTnLst>
+                    </p:cTn>
+                  </p:par>
+                  <p:par>
+                    <p:cTn id="21" fill="hold">
+                      <p:stCondLst>
+                        <p:cond delay="indefinite"/>
+                      </p:stCondLst>
+                      <p:childTnLst>
+                        <p:par>
+                          <p:cTn id="22" fill="hold">
+                            <p:stCondLst>
+                              <p:cond delay="0"/>
+                            </p:stCondLst>
+                            <p:childTnLst>
+                              <p:par>
+                                <p:cTn id="23" presetID="1" presetClass="entr" presetSubtype="0" fill="hold" nodeType="clickEffect">
+                                  <p:stCondLst>
+                                    <p:cond delay="0"/>
+                                  </p:stCondLst>
+                                  <p:childTnLst>
+                                    <p:set>
+                                      <p:cBhvr>
+                                        <p:cTn id="24" dur="1" fill="hold">
+                                          <p:stCondLst>
+                                            <p:cond delay="0"/>
+                                          </p:stCondLst>
+                                        </p:cTn>
+                                        <p:tgtEl>
+                                          <p:spTgt spid="10">
+                                            <p:txEl>
+                                              <p:pRg st="0" end="0"/>
+                                            </p:txEl>
+                                          </p:spTgt>
+                                        </p:tgtEl>
+                                        <p:attrNameLst>
+                                          <p:attrName>style.visibility</p:attrName>
+                                        </p:attrNameLst>
+                                      </p:cBhvr>
+                                      <p:to>
+                                        <p:strVal val="visible"/>
+                                      </p:to>
+                                    </p:set>
+                                  </p:childTnLst>
+                                </p:cTn>
+                              </p:par>
+                            </p:childTnLst>
+                          </p:cTn>
+                        </p:par>
+                      </p:childTnLst>
+                    </p:cTn>
+                  </p:par>
+                  <p:par>
+                    <p:cTn id="25" fill="hold">
+                      <p:stCondLst>
+                        <p:cond delay="indefinite"/>
+                      </p:stCondLst>
+                      <p:childTnLst>
+                        <p:par>
+                          <p:cTn id="26" fill="hold">
+                            <p:stCondLst>
+                              <p:cond delay="0"/>
+                            </p:stCondLst>
+                            <p:childTnLst>
+                              <p:par>
+                                <p:cTn id="27" presetID="1" presetClass="entr" presetSubtype="0" fill="hold" nodeType="clickEffect">
+                                  <p:stCondLst>
+                                    <p:cond delay="0"/>
+                                  </p:stCondLst>
+                                  <p:childTnLst>
+                                    <p:set>
+                                      <p:cBhvr>
+                                        <p:cTn id="28" dur="1" fill="hold">
+                                          <p:stCondLst>
+                                            <p:cond delay="0"/>
+                                          </p:stCondLst>
+                                        </p:cTn>
+                                        <p:tgtEl>
                                           <p:spTgt spid="10">
                                             <p:txEl>
                                               <p:pRg st="1" end="1"/>
+                                            </p:txEl>
+                                          </p:spTgt>
+                                        </p:tgtEl>
+                                        <p:attrNameLst>
+                                          <p:attrName>style.visibility</p:attrName>
+                                        </p:attrNameLst>
+                                      </p:cBhvr>
+                                      <p:to>
+                                        <p:strVal val="visible"/>
+                                      </p:to>
+                                    </p:set>
+                                  </p:childTnLst>
+                                </p:cTn>
+                              </p:par>
+                              <p:par>
+                                <p:cTn id="29" presetID="1" presetClass="entr" presetSubtype="0" fill="hold" nodeType="withEffect">
+                                  <p:stCondLst>
+                                    <p:cond delay="0"/>
+                                  </p:stCondLst>
+                                  <p:childTnLst>
+                                    <p:set>
+                                      <p:cBhvr>
+                                        <p:cTn id="30" dur="1" fill="hold">
+                                          <p:stCondLst>
+                                            <p:cond delay="0"/>
+                                          </p:stCondLst>
+                                        </p:cTn>
+                                        <p:tgtEl>
+                                          <p:spTgt spid="10">
+                                            <p:txEl>
+                                              <p:pRg st="2" end="2"/>
                                             </p:txEl>
                                           </p:spTgt>
                                         </p:tgtEl>
@@ -11100,8 +14693,8 @@
         </p:nvSpPr>
         <p:spPr>
           <a:xfrm>
-            <a:off x="4071937" y="1104900"/>
-            <a:ext cx="4648200" cy="3785652"/>
+            <a:off x="3767137" y="1104900"/>
+            <a:ext cx="5029200" cy="3785652"/>
           </a:xfrm>
           <a:prstGeom prst="rect">
             <a:avLst/>
@@ -11120,22 +14713,40 @@
                 <a:latin typeface="PFDinTextCompPro-Italic"/>
                 <a:cs typeface="PFDinTextCompPro-Italic"/>
               </a:rPr>
-              <a:t>Every email gets a </a:t>
-            </a:r>
-            <a:r>
-              <a:rPr lang="en-US" sz="3000" dirty="0" err="1" smtClean="0">
+              <a:t>Every </a:t>
+            </a:r>
+            <a:r>
+              <a:rPr lang="en-US" sz="3000" smtClean="0">
                 <a:latin typeface="PFDinTextCompPro-Italic"/>
                 <a:cs typeface="PFDinTextCompPro-Italic"/>
               </a:rPr>
-              <a:t>spamminess</a:t>
-            </a:r>
-            <a:r>
-              <a:rPr lang="en-US" sz="3000" dirty="0" smtClean="0">
+              <a:t>email </a:t>
+            </a:r>
+            <a:r>
+              <a:rPr lang="en-US" sz="3000" smtClean="0">
                 <a:latin typeface="PFDinTextCompPro-Italic"/>
                 <a:cs typeface="PFDinTextCompPro-Italic"/>
               </a:rPr>
-              <a:t> score. </a:t>
-            </a:r>
+              <a:t>is assigned a “spamminess” score</a:t>
+            </a:r>
+            <a:r>
+              <a:rPr lang="en-US" sz="3000">
+                <a:latin typeface="PFDinTextCompPro-Italic"/>
+                <a:cs typeface="PFDinTextCompPro-Italic"/>
+              </a:rPr>
+              <a:t> </a:t>
+            </a:r>
+            <a:r>
+              <a:rPr lang="en-US" sz="3000" smtClean="0">
+                <a:latin typeface="PFDinTextCompPro-Italic"/>
+                <a:cs typeface="PFDinTextCompPro-Italic"/>
+              </a:rPr>
+              <a:t>by our classification algorithm. To actually make our predictions, we choose a numeric cutoff for classifying as spam.</a:t>
+            </a:r>
+            <a:endParaRPr lang="en-US" sz="3000" dirty="0" smtClean="0">
+              <a:latin typeface="PFDinTextCompPro-Italic"/>
+              <a:cs typeface="PFDinTextCompPro-Italic"/>
+            </a:endParaRPr>
           </a:p>
           <a:p>
             <a:pPr algn="l"/>
@@ -11147,39 +14758,16 @@
           <a:p>
             <a:pPr algn="l"/>
             <a:r>
-              <a:rPr lang="en-US" sz="3000" dirty="0" smtClean="0">
+              <a:rPr lang="en-US" sz="3000" smtClean="0">
                 <a:latin typeface="PFDinTextCompPro-Italic"/>
                 <a:cs typeface="PFDinTextCompPro-Italic"/>
               </a:rPr>
-              <a:t>Choosing a cut-off, this becomes a classification.</a:t>
-            </a:r>
-          </a:p>
-          <a:p>
-            <a:pPr algn="l"/>
-            <a:endParaRPr lang="en-US" sz="3000" dirty="0">
+              <a:t>An ROC Curve will help us to visualize how well our classifier is doing without having to choose a cutoff!</a:t>
+            </a:r>
+            <a:endParaRPr lang="en-US" sz="3000" dirty="0" smtClean="0">
               <a:latin typeface="PFDinTextCompPro-Italic"/>
               <a:cs typeface="PFDinTextCompPro-Italic"/>
             </a:endParaRPr>
-          </a:p>
-          <a:p>
-            <a:pPr algn="l"/>
-            <a:r>
-              <a:rPr lang="en-US" sz="3000" dirty="0" smtClean="0">
-                <a:latin typeface="PFDinTextCompPro-Italic"/>
-                <a:cs typeface="PFDinTextCompPro-Italic"/>
-              </a:rPr>
-              <a:t>How do we choose a cut-off?</a:t>
-            </a:r>
-          </a:p>
-          <a:p>
-            <a:pPr algn="l"/>
-            <a:r>
-              <a:rPr lang="en-US" sz="3000" dirty="0" smtClean="0">
-                <a:latin typeface="PFDinTextCompPro-Italic"/>
-                <a:cs typeface="PFDinTextCompPro-Italic"/>
-              </a:rPr>
-              <a:t>How do we evaluate the ranking without choosing a cut-off?</a:t>
-            </a:r>
           </a:p>
         </p:txBody>
       </p:sp>
@@ -11255,13 +14843,13 @@
           <p:nvPr>
             <p:extLst>
               <p:ext uri="{D42A27DB-BD31-4B8C-83A1-F6EECF244321}">
-                <p14:modId xmlns:p14="http://schemas.microsoft.com/office/powerpoint/2010/main" val="1426171678"/>
+                <p14:modId xmlns:p14="http://schemas.microsoft.com/office/powerpoint/2010/main" val="1098102811"/>
               </p:ext>
             </p:extLst>
           </p:nvPr>
         </p:nvGraphicFramePr>
         <p:xfrm>
-          <a:off x="947737" y="1257300"/>
+          <a:off x="719137" y="1257300"/>
           <a:ext cx="2663826" cy="3454400"/>
         </p:xfrm>
         <a:graphic>
@@ -11339,8 +14927,8 @@
                     <a:lstStyle/>
                     <a:p>
                       <a:r>
-                        <a:rPr lang="en-US" dirty="0" smtClean="0"/>
-                        <a:t>0.93</a:t>
+                        <a:rPr lang="en-US" smtClean="0"/>
+                        <a:t>0.99</a:t>
                       </a:r>
                       <a:endParaRPr lang="en-US" dirty="0"/>
                     </a:p>
@@ -11383,8 +14971,8 @@
                     <a:lstStyle/>
                     <a:p>
                       <a:r>
-                        <a:rPr lang="en-US" dirty="0" smtClean="0"/>
-                        <a:t>0.91</a:t>
+                        <a:rPr lang="en-US" smtClean="0"/>
+                        <a:t>0.82</a:t>
                       </a:r>
                       <a:endParaRPr lang="en-US" dirty="0"/>
                     </a:p>
@@ -11427,8 +15015,8 @@
                     <a:lstStyle/>
                     <a:p>
                       <a:r>
-                        <a:rPr lang="en-US" dirty="0" smtClean="0"/>
-                        <a:t>0.84</a:t>
+                        <a:rPr lang="en-US" smtClean="0"/>
+                        <a:t>0.60</a:t>
                       </a:r>
                       <a:endParaRPr lang="en-US" dirty="0"/>
                     </a:p>
@@ -11471,8 +15059,8 @@
                     <a:lstStyle/>
                     <a:p>
                       <a:r>
-                        <a:rPr lang="en-US" dirty="0" smtClean="0"/>
-                        <a:t>0.6</a:t>
+                        <a:rPr lang="en-US" smtClean="0"/>
+                        <a:t>0.60</a:t>
                       </a:r>
                       <a:endParaRPr lang="en-US" dirty="0"/>
                     </a:p>
@@ -11515,8 +15103,8 @@
                     <a:lstStyle/>
                     <a:p>
                       <a:r>
-                        <a:rPr lang="en-US" dirty="0" smtClean="0"/>
-                        <a:t>0.54</a:t>
+                        <a:rPr lang="en-US" smtClean="0"/>
+                        <a:t>0.48</a:t>
                       </a:r>
                       <a:endParaRPr lang="en-US" dirty="0"/>
                     </a:p>
@@ -11688,7 +15276,79 @@
   <p:timing>
     <p:tnLst>
       <p:par>
-        <p:cTn id="1" dur="indefinite" restart="never" nodeType="tmRoot"/>
+        <p:cTn id="1" dur="indefinite" restart="never" nodeType="tmRoot">
+          <p:childTnLst>
+            <p:seq concurrent="1" nextAc="seek">
+              <p:cTn id="2" dur="indefinite" nodeType="mainSeq">
+                <p:childTnLst>
+                  <p:par>
+                    <p:cTn id="3" fill="hold">
+                      <p:stCondLst>
+                        <p:cond delay="indefinite"/>
+                      </p:stCondLst>
+                      <p:childTnLst>
+                        <p:par>
+                          <p:cTn id="4" fill="hold">
+                            <p:stCondLst>
+                              <p:cond delay="0"/>
+                            </p:stCondLst>
+                            <p:childTnLst>
+                              <p:par>
+                                <p:cTn id="5" presetID="1" presetClass="entr" presetSubtype="0" fill="hold" nodeType="clickEffect">
+                                  <p:stCondLst>
+                                    <p:cond delay="0"/>
+                                  </p:stCondLst>
+                                  <p:childTnLst>
+                                    <p:set>
+                                      <p:cBhvr>
+                                        <p:cTn id="6" dur="1" fill="hold">
+                                          <p:stCondLst>
+                                            <p:cond delay="0"/>
+                                          </p:stCondLst>
+                                        </p:cTn>
+                                        <p:tgtEl>
+                                          <p:spTgt spid="5">
+                                            <p:txEl>
+                                              <p:pRg st="2" end="2"/>
+                                            </p:txEl>
+                                          </p:spTgt>
+                                        </p:tgtEl>
+                                        <p:attrNameLst>
+                                          <p:attrName>style.visibility</p:attrName>
+                                        </p:attrNameLst>
+                                      </p:cBhvr>
+                                      <p:to>
+                                        <p:strVal val="visible"/>
+                                      </p:to>
+                                    </p:set>
+                                  </p:childTnLst>
+                                </p:cTn>
+                              </p:par>
+                            </p:childTnLst>
+                          </p:cTn>
+                        </p:par>
+                      </p:childTnLst>
+                    </p:cTn>
+                  </p:par>
+                </p:childTnLst>
+              </p:cTn>
+              <p:prevCondLst>
+                <p:cond evt="onPrev" delay="0">
+                  <p:tgtEl>
+                    <p:sldTgt/>
+                  </p:tgtEl>
+                </p:cond>
+              </p:prevCondLst>
+              <p:nextCondLst>
+                <p:cond evt="onNext" delay="0">
+                  <p:tgtEl>
+                    <p:sldTgt/>
+                  </p:tgtEl>
+                </p:cond>
+              </p:nextCondLst>
+            </p:seq>
+          </p:childTnLst>
+        </p:cTn>
       </p:par>
     </p:tnLst>
   </p:timing>
@@ -11736,12 +15396,23 @@
           <a:p>
             <a:pPr algn="l"/>
             <a:r>
-              <a:rPr lang="en-US" sz="3000" dirty="0" smtClean="0">
+              <a:rPr lang="en-US" sz="3000" smtClean="0">
                 <a:latin typeface="PFDinTextCompPro-Italic"/>
                 <a:cs typeface="PFDinTextCompPro-Italic"/>
               </a:rPr>
-              <a:t>ROC curve</a:t>
-            </a:r>
+              <a:t>ROC </a:t>
+            </a:r>
+            <a:r>
+              <a:rPr lang="en-US" sz="3000" smtClean="0">
+                <a:latin typeface="PFDinTextCompPro-Italic"/>
+                <a:cs typeface="PFDinTextCompPro-Italic"/>
+              </a:rPr>
+              <a:t>Curve</a:t>
+            </a:r>
+            <a:endParaRPr lang="en-US" sz="3000" dirty="0" smtClean="0">
+              <a:latin typeface="PFDinTextCompPro-Italic"/>
+              <a:cs typeface="PFDinTextCompPro-Italic"/>
+            </a:endParaRPr>
           </a:p>
         </p:txBody>
       </p:sp>
@@ -11817,13 +15488,13 @@
           <p:nvPr>
             <p:extLst>
               <p:ext uri="{D42A27DB-BD31-4B8C-83A1-F6EECF244321}">
-                <p14:modId xmlns:p14="http://schemas.microsoft.com/office/powerpoint/2010/main" val="42766845"/>
+                <p14:modId xmlns:p14="http://schemas.microsoft.com/office/powerpoint/2010/main" val="684204849"/>
               </p:ext>
             </p:extLst>
           </p:nvPr>
         </p:nvGraphicFramePr>
         <p:xfrm>
-          <a:off x="947737" y="1257300"/>
+          <a:off x="719137" y="1257300"/>
           <a:ext cx="2663826" cy="3454400"/>
         </p:xfrm>
         <a:graphic>
@@ -11901,8 +15572,8 @@
                     <a:lstStyle/>
                     <a:p>
                       <a:r>
-                        <a:rPr lang="en-US" dirty="0" smtClean="0"/>
-                        <a:t>0.93</a:t>
+                        <a:rPr lang="en-US" smtClean="0"/>
+                        <a:t>0.99</a:t>
                       </a:r>
                       <a:endParaRPr lang="en-US" dirty="0"/>
                     </a:p>
@@ -11945,8 +15616,8 @@
                     <a:lstStyle/>
                     <a:p>
                       <a:r>
-                        <a:rPr lang="en-US" dirty="0" smtClean="0"/>
-                        <a:t>0.91</a:t>
+                        <a:rPr lang="en-US" smtClean="0"/>
+                        <a:t>0.82</a:t>
                       </a:r>
                       <a:endParaRPr lang="en-US" dirty="0"/>
                     </a:p>
@@ -11989,8 +15660,8 @@
                     <a:lstStyle/>
                     <a:p>
                       <a:r>
-                        <a:rPr lang="en-US" dirty="0" smtClean="0"/>
-                        <a:t>0.84</a:t>
+                        <a:rPr lang="en-US" smtClean="0"/>
+                        <a:t>0.60</a:t>
                       </a:r>
                       <a:endParaRPr lang="en-US" dirty="0"/>
                     </a:p>
@@ -12033,8 +15704,8 @@
                     <a:lstStyle/>
                     <a:p>
                       <a:r>
-                        <a:rPr lang="en-US" dirty="0" smtClean="0"/>
-                        <a:t>0.6</a:t>
+                        <a:rPr lang="en-US" smtClean="0"/>
+                        <a:t>0.60</a:t>
                       </a:r>
                       <a:endParaRPr lang="en-US" dirty="0"/>
                     </a:p>
@@ -12077,8 +15748,8 @@
                     <a:lstStyle/>
                     <a:p>
                       <a:r>
-                        <a:rPr lang="en-US" dirty="0" smtClean="0"/>
-                        <a:t>0.54</a:t>
+                        <a:rPr lang="en-US" smtClean="0"/>
+                        <a:t>0.48</a:t>
                       </a:r>
                       <a:endParaRPr lang="en-US" dirty="0"/>
                     </a:p>

</xml_diff>